<commit_message>
MAJ diapo revu 2
</commit_message>
<xml_diff>
--- a/oral_projet/revue_2/diaporama_revue_2_dylan.pptx
+++ b/oral_projet/revue_2/diaporama_revue_2_dylan.pptx
@@ -7891,114 +7891,6 @@
           </a:p>
         </p:txBody>
       </p:sp>
-      <p:pic>
-        <p:nvPicPr>
-          <p:cNvPr id="4" name="Image 3">
-            <a:extLst>
-              <a:ext uri="{FF2B5EF4-FFF2-40B4-BE49-F238E27FC236}">
-                <a16:creationId xmlns:a16="http://schemas.microsoft.com/office/drawing/2014/main" id="{D397238E-4CC4-4E40-A03F-CA5168B16AFC}"/>
-              </a:ext>
-            </a:extLst>
-          </p:cNvPr>
-          <p:cNvPicPr>
-            <a:picLocks noChangeAspect="1"/>
-          </p:cNvPicPr>
-          <p:nvPr/>
-        </p:nvPicPr>
-        <p:blipFill>
-          <a:blip r:embed="rId4">
-            <a:extLst>
-              <a:ext uri="{28A0092B-C50C-407E-A947-70E740481C1C}">
-                <a14:useLocalDpi xmlns:a14="http://schemas.microsoft.com/office/drawing/2010/main" val="0"/>
-              </a:ext>
-            </a:extLst>
-          </a:blip>
-          <a:stretch>
-            <a:fillRect/>
-          </a:stretch>
-        </p:blipFill>
-        <p:spPr>
-          <a:xfrm>
-            <a:off x="1881432" y="4945224"/>
-            <a:ext cx="990600" cy="990600"/>
-          </a:xfrm>
-          <a:prstGeom prst="rect">
-            <a:avLst/>
-          </a:prstGeom>
-        </p:spPr>
-      </p:pic>
-      <p:pic>
-        <p:nvPicPr>
-          <p:cNvPr id="6" name="Image 5">
-            <a:extLst>
-              <a:ext uri="{FF2B5EF4-FFF2-40B4-BE49-F238E27FC236}">
-                <a16:creationId xmlns:a16="http://schemas.microsoft.com/office/drawing/2014/main" id="{217C5B42-FC3B-460B-B430-4FE5CFDEFE08}"/>
-              </a:ext>
-            </a:extLst>
-          </p:cNvPr>
-          <p:cNvPicPr>
-            <a:picLocks noChangeAspect="1"/>
-          </p:cNvPicPr>
-          <p:nvPr/>
-        </p:nvPicPr>
-        <p:blipFill>
-          <a:blip r:embed="rId5">
-            <a:extLst>
-              <a:ext uri="{28A0092B-C50C-407E-A947-70E740481C1C}">
-                <a14:useLocalDpi xmlns:a14="http://schemas.microsoft.com/office/drawing/2010/main" val="0"/>
-              </a:ext>
-            </a:extLst>
-          </a:blip>
-          <a:stretch>
-            <a:fillRect/>
-          </a:stretch>
-        </p:blipFill>
-        <p:spPr>
-          <a:xfrm>
-            <a:off x="6753255" y="4945224"/>
-            <a:ext cx="1194833" cy="1297393"/>
-          </a:xfrm>
-          <a:prstGeom prst="rect">
-            <a:avLst/>
-          </a:prstGeom>
-        </p:spPr>
-      </p:pic>
-      <p:pic>
-        <p:nvPicPr>
-          <p:cNvPr id="27" name="Image 26">
-            <a:extLst>
-              <a:ext uri="{FF2B5EF4-FFF2-40B4-BE49-F238E27FC236}">
-                <a16:creationId xmlns:a16="http://schemas.microsoft.com/office/drawing/2014/main" id="{2743F8F1-CE6B-4582-819C-46D84CFAEC85}"/>
-              </a:ext>
-            </a:extLst>
-          </p:cNvPr>
-          <p:cNvPicPr>
-            <a:picLocks noChangeAspect="1"/>
-          </p:cNvPicPr>
-          <p:nvPr/>
-        </p:nvPicPr>
-        <p:blipFill>
-          <a:blip r:embed="rId6">
-            <a:extLst>
-              <a:ext uri="{28A0092B-C50C-407E-A947-70E740481C1C}">
-                <a14:useLocalDpi xmlns:a14="http://schemas.microsoft.com/office/drawing/2010/main" val="0"/>
-              </a:ext>
-            </a:extLst>
-          </a:blip>
-          <a:stretch>
-            <a:fillRect/>
-          </a:stretch>
-        </p:blipFill>
-        <p:spPr>
-          <a:xfrm>
-            <a:off x="4450205" y="3918856"/>
-            <a:ext cx="1082352" cy="1082352"/>
-          </a:xfrm>
-          <a:prstGeom prst="rect">
-            <a:avLst/>
-          </a:prstGeom>
-        </p:spPr>
-      </p:pic>
       <p:sp>
         <p:nvSpPr>
           <p:cNvPr id="7" name="ZoneTexte 6">
@@ -8013,7 +7905,7 @@
         </p:nvSpPr>
         <p:spPr>
           <a:xfrm>
-            <a:off x="3714642" y="1427584"/>
+            <a:off x="4115087" y="1292497"/>
             <a:ext cx="4309685" cy="523220"/>
           </a:xfrm>
           <a:prstGeom prst="rect">
@@ -8029,7 +7921,7 @@
           <a:p>
             <a:r>
               <a:rPr lang="fr-FR" sz="2800" dirty="0"/>
-              <a:t>Partie 1 : Anémomètre</a:t>
+              <a:t>Partie 1 : Pluviomètre</a:t>
             </a:r>
           </a:p>
         </p:txBody>
@@ -14433,7 +14325,7 @@
 </file>
 
 <file path=ppt/slides/slide5.xml><?xml version="1.0" encoding="utf-8"?>
-<p:sld xmlns:a="http://schemas.openxmlformats.org/drawingml/2006/main" xmlns:r="http://schemas.openxmlformats.org/officeDocument/2006/relationships" xmlns:p="http://schemas.openxmlformats.org/presentationml/2006/main">
+<p:sld xmlns:a="http://schemas.openxmlformats.org/drawingml/2006/main" xmlns:r="http://schemas.openxmlformats.org/officeDocument/2006/relationships" xmlns:p="http://schemas.openxmlformats.org/presentationml/2006/main" show="0">
   <p:cSld>
     <p:spTree>
       <p:nvGrpSpPr>
@@ -14935,418 +14827,6 @@
           </a:p>
         </p:txBody>
       </p:sp>
-      <p:pic>
-        <p:nvPicPr>
-          <p:cNvPr id="29" name="Image 28">
-            <a:extLst>
-              <a:ext uri="{FF2B5EF4-FFF2-40B4-BE49-F238E27FC236}">
-                <a16:creationId xmlns:a16="http://schemas.microsoft.com/office/drawing/2014/main" id="{209747D1-F6E3-409A-B896-B03CE9516BF8}"/>
-              </a:ext>
-            </a:extLst>
-          </p:cNvPr>
-          <p:cNvPicPr>
-            <a:picLocks noChangeAspect="1"/>
-          </p:cNvPicPr>
-          <p:nvPr/>
-        </p:nvPicPr>
-        <p:blipFill>
-          <a:blip r:embed="rId4">
-            <a:extLst>
-              <a:ext uri="{28A0092B-C50C-407E-A947-70E740481C1C}">
-                <a14:useLocalDpi xmlns:a14="http://schemas.microsoft.com/office/drawing/2010/main" val="0"/>
-              </a:ext>
-            </a:extLst>
-          </a:blip>
-          <a:stretch>
-            <a:fillRect/>
-          </a:stretch>
-        </p:blipFill>
-        <p:spPr>
-          <a:xfrm>
-            <a:off x="6719022" y="2512865"/>
-            <a:ext cx="728101" cy="728101"/>
-          </a:xfrm>
-          <a:prstGeom prst="rect">
-            <a:avLst/>
-          </a:prstGeom>
-        </p:spPr>
-      </p:pic>
-      <p:pic>
-        <p:nvPicPr>
-          <p:cNvPr id="25" name="Image 24">
-            <a:extLst>
-              <a:ext uri="{FF2B5EF4-FFF2-40B4-BE49-F238E27FC236}">
-                <a16:creationId xmlns:a16="http://schemas.microsoft.com/office/drawing/2014/main" id="{93BBF0E5-204B-42FF-9A5D-235230C6F27F}"/>
-              </a:ext>
-            </a:extLst>
-          </p:cNvPr>
-          <p:cNvPicPr>
-            <a:picLocks noChangeAspect="1"/>
-          </p:cNvPicPr>
-          <p:nvPr/>
-        </p:nvPicPr>
-        <p:blipFill>
-          <a:blip r:embed="rId5">
-            <a:extLst>
-              <a:ext uri="{28A0092B-C50C-407E-A947-70E740481C1C}">
-                <a14:useLocalDpi xmlns:a14="http://schemas.microsoft.com/office/drawing/2010/main" val="0"/>
-              </a:ext>
-            </a:extLst>
-          </a:blip>
-          <a:stretch>
-            <a:fillRect/>
-          </a:stretch>
-        </p:blipFill>
-        <p:spPr>
-          <a:xfrm>
-            <a:off x="6959469" y="3772894"/>
-            <a:ext cx="487653" cy="487653"/>
-          </a:xfrm>
-          <a:prstGeom prst="rect">
-            <a:avLst/>
-          </a:prstGeom>
-        </p:spPr>
-      </p:pic>
-      <p:pic>
-        <p:nvPicPr>
-          <p:cNvPr id="35" name="Image 34">
-            <a:extLst>
-              <a:ext uri="{FF2B5EF4-FFF2-40B4-BE49-F238E27FC236}">
-                <a16:creationId xmlns:a16="http://schemas.microsoft.com/office/drawing/2014/main" id="{3AA4106B-4FA4-4D66-995F-237DE6EAEF75}"/>
-              </a:ext>
-            </a:extLst>
-          </p:cNvPr>
-          <p:cNvPicPr>
-            <a:picLocks noChangeAspect="1"/>
-          </p:cNvPicPr>
-          <p:nvPr/>
-        </p:nvPicPr>
-        <p:blipFill>
-          <a:blip r:embed="rId6">
-            <a:extLst>
-              <a:ext uri="{28A0092B-C50C-407E-A947-70E740481C1C}">
-                <a14:useLocalDpi xmlns:a14="http://schemas.microsoft.com/office/drawing/2010/main" val="0"/>
-              </a:ext>
-            </a:extLst>
-          </a:blip>
-          <a:stretch>
-            <a:fillRect/>
-          </a:stretch>
-        </p:blipFill>
-        <p:spPr>
-          <a:xfrm>
-            <a:off x="7215446" y="4929137"/>
-            <a:ext cx="527336" cy="527336"/>
-          </a:xfrm>
-          <a:prstGeom prst="rect">
-            <a:avLst/>
-          </a:prstGeom>
-        </p:spPr>
-      </p:pic>
-      <p:pic>
-        <p:nvPicPr>
-          <p:cNvPr id="4" name="Image 3">
-            <a:extLst>
-              <a:ext uri="{FF2B5EF4-FFF2-40B4-BE49-F238E27FC236}">
-                <a16:creationId xmlns:a16="http://schemas.microsoft.com/office/drawing/2014/main" id="{225101B9-36CD-4BE6-A596-45C653C1A0BF}"/>
-              </a:ext>
-            </a:extLst>
-          </p:cNvPr>
-          <p:cNvPicPr>
-            <a:picLocks noChangeAspect="1"/>
-          </p:cNvPicPr>
-          <p:nvPr/>
-        </p:nvPicPr>
-        <p:blipFill>
-          <a:blip r:embed="rId7">
-            <a:extLst>
-              <a:ext uri="{28A0092B-C50C-407E-A947-70E740481C1C}">
-                <a14:useLocalDpi xmlns:a14="http://schemas.microsoft.com/office/drawing/2010/main" val="0"/>
-              </a:ext>
-            </a:extLst>
-          </a:blip>
-          <a:stretch>
-            <a:fillRect/>
-          </a:stretch>
-        </p:blipFill>
-        <p:spPr>
-          <a:xfrm>
-            <a:off x="7086558" y="4322761"/>
-            <a:ext cx="487653" cy="487653"/>
-          </a:xfrm>
-          <a:prstGeom prst="rect">
-            <a:avLst/>
-          </a:prstGeom>
-        </p:spPr>
-      </p:pic>
-      <p:sp>
-        <p:nvSpPr>
-          <p:cNvPr id="2" name="ZoneTexte 1">
-            <a:extLst>
-              <a:ext uri="{FF2B5EF4-FFF2-40B4-BE49-F238E27FC236}">
-                <a16:creationId xmlns:a16="http://schemas.microsoft.com/office/drawing/2014/main" id="{05E036AC-ACE8-48BF-BBAF-B4AEC36D3108}"/>
-              </a:ext>
-            </a:extLst>
-          </p:cNvPr>
-          <p:cNvSpPr txBox="1"/>
-          <p:nvPr/>
-        </p:nvSpPr>
-        <p:spPr>
-          <a:xfrm>
-            <a:off x="3041778" y="2692250"/>
-            <a:ext cx="3322041" cy="369332"/>
-          </a:xfrm>
-          <a:prstGeom prst="rect">
-            <a:avLst/>
-          </a:prstGeom>
-          <a:noFill/>
-        </p:spPr>
-        <p:txBody>
-          <a:bodyPr wrap="square" rtlCol="0">
-            <a:spAutoFit/>
-          </a:bodyPr>
-          <a:lstStyle/>
-          <a:p>
-            <a:pPr marL="285750" indent="-285750">
-              <a:buFontTx/>
-              <a:buChar char="-"/>
-            </a:pPr>
-            <a:r>
-              <a:rPr lang="fr-FR" dirty="0"/>
-              <a:t>Démarrer l'acquisition</a:t>
-            </a:r>
-          </a:p>
-        </p:txBody>
-      </p:sp>
-      <p:sp>
-        <p:nvSpPr>
-          <p:cNvPr id="5" name="ZoneTexte 4">
-            <a:extLst>
-              <a:ext uri="{FF2B5EF4-FFF2-40B4-BE49-F238E27FC236}">
-                <a16:creationId xmlns:a16="http://schemas.microsoft.com/office/drawing/2014/main" id="{542281A4-00AF-4DEE-83C9-52B2A9F880D0}"/>
-              </a:ext>
-            </a:extLst>
-          </p:cNvPr>
-          <p:cNvSpPr txBox="1"/>
-          <p:nvPr/>
-        </p:nvSpPr>
-        <p:spPr>
-          <a:xfrm>
-            <a:off x="3041778" y="3264661"/>
-            <a:ext cx="3250607" cy="646331"/>
-          </a:xfrm>
-          <a:prstGeom prst="rect">
-            <a:avLst/>
-          </a:prstGeom>
-          <a:noFill/>
-        </p:spPr>
-        <p:txBody>
-          <a:bodyPr wrap="square" rtlCol="0">
-            <a:spAutoFit/>
-          </a:bodyPr>
-          <a:lstStyle/>
-          <a:p>
-            <a:r>
-              <a:rPr lang="fr-FR" dirty="0"/>
-              <a:t>-    Mesurer la direction du vent</a:t>
-            </a:r>
-          </a:p>
-          <a:p>
-            <a:endParaRPr lang="fr-FR" dirty="0"/>
-          </a:p>
-        </p:txBody>
-      </p:sp>
-      <p:sp>
-        <p:nvSpPr>
-          <p:cNvPr id="6" name="ZoneTexte 5">
-            <a:extLst>
-              <a:ext uri="{FF2B5EF4-FFF2-40B4-BE49-F238E27FC236}">
-                <a16:creationId xmlns:a16="http://schemas.microsoft.com/office/drawing/2014/main" id="{7850E2D6-F8C4-40F5-98CF-62074DCA6F4B}"/>
-              </a:ext>
-            </a:extLst>
-          </p:cNvPr>
-          <p:cNvSpPr txBox="1"/>
-          <p:nvPr/>
-        </p:nvSpPr>
-        <p:spPr>
-          <a:xfrm>
-            <a:off x="3041778" y="3854470"/>
-            <a:ext cx="2861108" cy="646331"/>
-          </a:xfrm>
-          <a:prstGeom prst="rect">
-            <a:avLst/>
-          </a:prstGeom>
-          <a:noFill/>
-        </p:spPr>
-        <p:txBody>
-          <a:bodyPr wrap="square" rtlCol="0">
-            <a:spAutoFit/>
-          </a:bodyPr>
-          <a:lstStyle/>
-          <a:p>
-            <a:r>
-              <a:rPr lang="fr-FR" dirty="0"/>
-              <a:t>-    Mesurer la force du vent</a:t>
-            </a:r>
-          </a:p>
-          <a:p>
-            <a:endParaRPr lang="fr-FR" dirty="0"/>
-          </a:p>
-        </p:txBody>
-      </p:sp>
-      <p:sp>
-        <p:nvSpPr>
-          <p:cNvPr id="7" name="ZoneTexte 6">
-            <a:extLst>
-              <a:ext uri="{FF2B5EF4-FFF2-40B4-BE49-F238E27FC236}">
-                <a16:creationId xmlns:a16="http://schemas.microsoft.com/office/drawing/2014/main" id="{8BECE744-1AC3-40E4-AAE7-4BE4A8A4A5D5}"/>
-              </a:ext>
-            </a:extLst>
-          </p:cNvPr>
-          <p:cNvSpPr txBox="1"/>
-          <p:nvPr/>
-        </p:nvSpPr>
-        <p:spPr>
-          <a:xfrm>
-            <a:off x="3041778" y="4429503"/>
-            <a:ext cx="3514988" cy="646331"/>
-          </a:xfrm>
-          <a:prstGeom prst="rect">
-            <a:avLst/>
-          </a:prstGeom>
-          <a:noFill/>
-        </p:spPr>
-        <p:txBody>
-          <a:bodyPr wrap="square" rtlCol="0">
-            <a:spAutoFit/>
-          </a:bodyPr>
-          <a:lstStyle/>
-          <a:p>
-            <a:r>
-              <a:rPr lang="fr-FR" dirty="0"/>
-              <a:t>-    Définir la période des mesures</a:t>
-            </a:r>
-          </a:p>
-          <a:p>
-            <a:endParaRPr lang="fr-FR" dirty="0"/>
-          </a:p>
-        </p:txBody>
-      </p:sp>
-      <p:sp>
-        <p:nvSpPr>
-          <p:cNvPr id="11" name="ZoneTexte 10">
-            <a:extLst>
-              <a:ext uri="{FF2B5EF4-FFF2-40B4-BE49-F238E27FC236}">
-                <a16:creationId xmlns:a16="http://schemas.microsoft.com/office/drawing/2014/main" id="{307C9646-6910-4ED9-89DA-0D27774FC650}"/>
-              </a:ext>
-            </a:extLst>
-          </p:cNvPr>
-          <p:cNvSpPr txBox="1"/>
-          <p:nvPr/>
-        </p:nvSpPr>
-        <p:spPr>
-          <a:xfrm>
-            <a:off x="3041778" y="4752669"/>
-            <a:ext cx="3677244" cy="923330"/>
-          </a:xfrm>
-          <a:prstGeom prst="rect">
-            <a:avLst/>
-          </a:prstGeom>
-          <a:noFill/>
-        </p:spPr>
-        <p:txBody>
-          <a:bodyPr wrap="square" rtlCol="0">
-            <a:spAutoFit/>
-          </a:bodyPr>
-          <a:lstStyle/>
-          <a:p>
-            <a:endParaRPr lang="fr-FR" dirty="0"/>
-          </a:p>
-          <a:p>
-            <a:r>
-              <a:rPr lang="fr-FR" dirty="0"/>
-              <a:t>-     Envoyer les mesures dans la BDD</a:t>
-            </a:r>
-          </a:p>
-          <a:p>
-            <a:endParaRPr lang="fr-FR" dirty="0"/>
-          </a:p>
-        </p:txBody>
-      </p:sp>
-      <p:sp>
-        <p:nvSpPr>
-          <p:cNvPr id="12" name="ZoneTexte 11">
-            <a:extLst>
-              <a:ext uri="{FF2B5EF4-FFF2-40B4-BE49-F238E27FC236}">
-                <a16:creationId xmlns:a16="http://schemas.microsoft.com/office/drawing/2014/main" id="{A055705F-59A8-43B2-B070-22F171CD9E9B}"/>
-              </a:ext>
-            </a:extLst>
-          </p:cNvPr>
-          <p:cNvSpPr txBox="1"/>
-          <p:nvPr/>
-        </p:nvSpPr>
-        <p:spPr>
-          <a:xfrm>
-            <a:off x="3041778" y="1789374"/>
-            <a:ext cx="7373922" cy="923330"/>
-          </a:xfrm>
-          <a:prstGeom prst="rect">
-            <a:avLst/>
-          </a:prstGeom>
-          <a:noFill/>
-        </p:spPr>
-        <p:txBody>
-          <a:bodyPr wrap="square" rtlCol="0">
-            <a:spAutoFit/>
-          </a:bodyPr>
-          <a:lstStyle/>
-          <a:p>
-            <a:r>
-              <a:rPr lang="fr-FR" dirty="0"/>
-              <a:t>Un système (Raspberry) récupèrera automatiquement les différentes mesures énoncées ci-dessus.</a:t>
-            </a:r>
-          </a:p>
-          <a:p>
-            <a:endParaRPr lang="fr-FR" dirty="0"/>
-          </a:p>
-        </p:txBody>
-      </p:sp>
-      <p:pic>
-        <p:nvPicPr>
-          <p:cNvPr id="14" name="Image 13">
-            <a:extLst>
-              <a:ext uri="{FF2B5EF4-FFF2-40B4-BE49-F238E27FC236}">
-                <a16:creationId xmlns:a16="http://schemas.microsoft.com/office/drawing/2014/main" id="{91A48376-3A1D-42DD-A47C-440EA5F074DD}"/>
-              </a:ext>
-            </a:extLst>
-          </p:cNvPr>
-          <p:cNvPicPr>
-            <a:picLocks noChangeAspect="1"/>
-          </p:cNvPicPr>
-          <p:nvPr/>
-        </p:nvPicPr>
-        <p:blipFill>
-          <a:blip r:embed="rId8">
-            <a:extLst>
-              <a:ext uri="{28A0092B-C50C-407E-A947-70E740481C1C}">
-                <a14:useLocalDpi xmlns:a14="http://schemas.microsoft.com/office/drawing/2010/main" val="0"/>
-              </a:ext>
-            </a:extLst>
-          </a:blip>
-          <a:stretch>
-            <a:fillRect/>
-          </a:stretch>
-        </p:blipFill>
-        <p:spPr>
-          <a:xfrm>
-            <a:off x="6828818" y="3192584"/>
-            <a:ext cx="650296" cy="650296"/>
-          </a:xfrm>
-          <a:prstGeom prst="rect">
-            <a:avLst/>
-          </a:prstGeom>
-        </p:spPr>
-      </p:pic>
     </p:spTree>
     <p:extLst>
       <p:ext uri="{BB962C8B-B14F-4D97-AF65-F5344CB8AC3E}">
@@ -15357,874 +14837,18 @@
   <p:clrMapOvr>
     <a:masterClrMapping/>
   </p:clrMapOvr>
-  <mc:AlternateContent xmlns:mc="http://schemas.openxmlformats.org/markup-compatibility/2006" xmlns:p14="http://schemas.microsoft.com/office/powerpoint/2010/main">
-    <mc:Choice Requires="p14">
+  <mc:AlternateContent xmlns:mc="http://schemas.openxmlformats.org/markup-compatibility/2006">
+    <mc:Choice xmlns:p14="http://schemas.microsoft.com/office/powerpoint/2010/main" Requires="p14">
       <p:transition spd="slow">
         <p14:reveal/>
       </p:transition>
     </mc:Choice>
-    <mc:Fallback xmlns="">
+    <mc:Fallback>
       <p:transition spd="slow">
         <p:fade/>
       </p:transition>
     </mc:Fallback>
   </mc:AlternateContent>
-  <p:timing>
-    <p:tnLst>
-      <p:par>
-        <p:cTn id="1" dur="indefinite" restart="never" nodeType="tmRoot">
-          <p:childTnLst>
-            <p:seq concurrent="1" nextAc="seek">
-              <p:cTn id="2" dur="indefinite" nodeType="mainSeq">
-                <p:childTnLst>
-                  <p:par>
-                    <p:cTn id="3" fill="hold">
-                      <p:stCondLst>
-                        <p:cond delay="indefinite"/>
-                      </p:stCondLst>
-                      <p:childTnLst>
-                        <p:par>
-                          <p:cTn id="4" fill="hold">
-                            <p:stCondLst>
-                              <p:cond delay="0"/>
-                            </p:stCondLst>
-                            <p:childTnLst>
-                              <p:par>
-                                <p:cTn id="5" presetID="42" presetClass="entr" presetSubtype="0" fill="hold" nodeType="clickEffect">
-                                  <p:stCondLst>
-                                    <p:cond delay="0"/>
-                                  </p:stCondLst>
-                                  <p:childTnLst>
-                                    <p:set>
-                                      <p:cBhvr>
-                                        <p:cTn id="6" dur="1" fill="hold">
-                                          <p:stCondLst>
-                                            <p:cond delay="0"/>
-                                          </p:stCondLst>
-                                        </p:cTn>
-                                        <p:tgtEl>
-                                          <p:spTgt spid="29"/>
-                                        </p:tgtEl>
-                                        <p:attrNameLst>
-                                          <p:attrName>style.visibility</p:attrName>
-                                        </p:attrNameLst>
-                                      </p:cBhvr>
-                                      <p:to>
-                                        <p:strVal val="visible"/>
-                                      </p:to>
-                                    </p:set>
-                                    <p:animEffect transition="in" filter="fade">
-                                      <p:cBhvr>
-                                        <p:cTn id="7" dur="1000"/>
-                                        <p:tgtEl>
-                                          <p:spTgt spid="29"/>
-                                        </p:tgtEl>
-                                      </p:cBhvr>
-                                    </p:animEffect>
-                                    <p:anim calcmode="lin" valueType="num">
-                                      <p:cBhvr>
-                                        <p:cTn id="8" dur="1000" fill="hold"/>
-                                        <p:tgtEl>
-                                          <p:spTgt spid="29"/>
-                                        </p:tgtEl>
-                                        <p:attrNameLst>
-                                          <p:attrName>ppt_x</p:attrName>
-                                        </p:attrNameLst>
-                                      </p:cBhvr>
-                                      <p:tavLst>
-                                        <p:tav tm="0">
-                                          <p:val>
-                                            <p:strVal val="#ppt_x"/>
-                                          </p:val>
-                                        </p:tav>
-                                        <p:tav tm="100000">
-                                          <p:val>
-                                            <p:strVal val="#ppt_x"/>
-                                          </p:val>
-                                        </p:tav>
-                                      </p:tavLst>
-                                    </p:anim>
-                                    <p:anim calcmode="lin" valueType="num">
-                                      <p:cBhvr>
-                                        <p:cTn id="9" dur="1000" fill="hold"/>
-                                        <p:tgtEl>
-                                          <p:spTgt spid="29"/>
-                                        </p:tgtEl>
-                                        <p:attrNameLst>
-                                          <p:attrName>ppt_y</p:attrName>
-                                        </p:attrNameLst>
-                                      </p:cBhvr>
-                                      <p:tavLst>
-                                        <p:tav tm="0">
-                                          <p:val>
-                                            <p:strVal val="#ppt_y+.1"/>
-                                          </p:val>
-                                        </p:tav>
-                                        <p:tav tm="100000">
-                                          <p:val>
-                                            <p:strVal val="#ppt_y"/>
-                                          </p:val>
-                                        </p:tav>
-                                      </p:tavLst>
-                                    </p:anim>
-                                  </p:childTnLst>
-                                </p:cTn>
-                              </p:par>
-                              <p:par>
-                                <p:cTn id="10" presetID="42" presetClass="entr" presetSubtype="0" fill="hold" grpId="0" nodeType="withEffect">
-                                  <p:stCondLst>
-                                    <p:cond delay="0"/>
-                                  </p:stCondLst>
-                                  <p:childTnLst>
-                                    <p:set>
-                                      <p:cBhvr>
-                                        <p:cTn id="11" dur="1" fill="hold">
-                                          <p:stCondLst>
-                                            <p:cond delay="0"/>
-                                          </p:stCondLst>
-                                        </p:cTn>
-                                        <p:tgtEl>
-                                          <p:spTgt spid="2"/>
-                                        </p:tgtEl>
-                                        <p:attrNameLst>
-                                          <p:attrName>style.visibility</p:attrName>
-                                        </p:attrNameLst>
-                                      </p:cBhvr>
-                                      <p:to>
-                                        <p:strVal val="visible"/>
-                                      </p:to>
-                                    </p:set>
-                                    <p:animEffect transition="in" filter="fade">
-                                      <p:cBhvr>
-                                        <p:cTn id="12" dur="1000"/>
-                                        <p:tgtEl>
-                                          <p:spTgt spid="2"/>
-                                        </p:tgtEl>
-                                      </p:cBhvr>
-                                    </p:animEffect>
-                                    <p:anim calcmode="lin" valueType="num">
-                                      <p:cBhvr>
-                                        <p:cTn id="13" dur="1000" fill="hold"/>
-                                        <p:tgtEl>
-                                          <p:spTgt spid="2"/>
-                                        </p:tgtEl>
-                                        <p:attrNameLst>
-                                          <p:attrName>ppt_x</p:attrName>
-                                        </p:attrNameLst>
-                                      </p:cBhvr>
-                                      <p:tavLst>
-                                        <p:tav tm="0">
-                                          <p:val>
-                                            <p:strVal val="#ppt_x"/>
-                                          </p:val>
-                                        </p:tav>
-                                        <p:tav tm="100000">
-                                          <p:val>
-                                            <p:strVal val="#ppt_x"/>
-                                          </p:val>
-                                        </p:tav>
-                                      </p:tavLst>
-                                    </p:anim>
-                                    <p:anim calcmode="lin" valueType="num">
-                                      <p:cBhvr>
-                                        <p:cTn id="14" dur="1000" fill="hold"/>
-                                        <p:tgtEl>
-                                          <p:spTgt spid="2"/>
-                                        </p:tgtEl>
-                                        <p:attrNameLst>
-                                          <p:attrName>ppt_y</p:attrName>
-                                        </p:attrNameLst>
-                                      </p:cBhvr>
-                                      <p:tavLst>
-                                        <p:tav tm="0">
-                                          <p:val>
-                                            <p:strVal val="#ppt_y+.1"/>
-                                          </p:val>
-                                        </p:tav>
-                                        <p:tav tm="100000">
-                                          <p:val>
-                                            <p:strVal val="#ppt_y"/>
-                                          </p:val>
-                                        </p:tav>
-                                      </p:tavLst>
-                                    </p:anim>
-                                  </p:childTnLst>
-                                </p:cTn>
-                              </p:par>
-                            </p:childTnLst>
-                          </p:cTn>
-                        </p:par>
-                      </p:childTnLst>
-                    </p:cTn>
-                  </p:par>
-                  <p:par>
-                    <p:cTn id="15" fill="hold">
-                      <p:stCondLst>
-                        <p:cond delay="indefinite"/>
-                      </p:stCondLst>
-                      <p:childTnLst>
-                        <p:par>
-                          <p:cTn id="16" fill="hold">
-                            <p:stCondLst>
-                              <p:cond delay="0"/>
-                            </p:stCondLst>
-                            <p:childTnLst>
-                              <p:par>
-                                <p:cTn id="17" presetID="42" presetClass="entr" presetSubtype="0" fill="hold" grpId="0" nodeType="clickEffect">
-                                  <p:stCondLst>
-                                    <p:cond delay="0"/>
-                                  </p:stCondLst>
-                                  <p:childTnLst>
-                                    <p:set>
-                                      <p:cBhvr>
-                                        <p:cTn id="18" dur="1" fill="hold">
-                                          <p:stCondLst>
-                                            <p:cond delay="0"/>
-                                          </p:stCondLst>
-                                        </p:cTn>
-                                        <p:tgtEl>
-                                          <p:spTgt spid="5"/>
-                                        </p:tgtEl>
-                                        <p:attrNameLst>
-                                          <p:attrName>style.visibility</p:attrName>
-                                        </p:attrNameLst>
-                                      </p:cBhvr>
-                                      <p:to>
-                                        <p:strVal val="visible"/>
-                                      </p:to>
-                                    </p:set>
-                                    <p:animEffect transition="in" filter="fade">
-                                      <p:cBhvr>
-                                        <p:cTn id="19" dur="1000"/>
-                                        <p:tgtEl>
-                                          <p:spTgt spid="5"/>
-                                        </p:tgtEl>
-                                      </p:cBhvr>
-                                    </p:animEffect>
-                                    <p:anim calcmode="lin" valueType="num">
-                                      <p:cBhvr>
-                                        <p:cTn id="20" dur="1000" fill="hold"/>
-                                        <p:tgtEl>
-                                          <p:spTgt spid="5"/>
-                                        </p:tgtEl>
-                                        <p:attrNameLst>
-                                          <p:attrName>ppt_x</p:attrName>
-                                        </p:attrNameLst>
-                                      </p:cBhvr>
-                                      <p:tavLst>
-                                        <p:tav tm="0">
-                                          <p:val>
-                                            <p:strVal val="#ppt_x"/>
-                                          </p:val>
-                                        </p:tav>
-                                        <p:tav tm="100000">
-                                          <p:val>
-                                            <p:strVal val="#ppt_x"/>
-                                          </p:val>
-                                        </p:tav>
-                                      </p:tavLst>
-                                    </p:anim>
-                                    <p:anim calcmode="lin" valueType="num">
-                                      <p:cBhvr>
-                                        <p:cTn id="21" dur="1000" fill="hold"/>
-                                        <p:tgtEl>
-                                          <p:spTgt spid="5"/>
-                                        </p:tgtEl>
-                                        <p:attrNameLst>
-                                          <p:attrName>ppt_y</p:attrName>
-                                        </p:attrNameLst>
-                                      </p:cBhvr>
-                                      <p:tavLst>
-                                        <p:tav tm="0">
-                                          <p:val>
-                                            <p:strVal val="#ppt_y+.1"/>
-                                          </p:val>
-                                        </p:tav>
-                                        <p:tav tm="100000">
-                                          <p:val>
-                                            <p:strVal val="#ppt_y"/>
-                                          </p:val>
-                                        </p:tav>
-                                      </p:tavLst>
-                                    </p:anim>
-                                  </p:childTnLst>
-                                </p:cTn>
-                              </p:par>
-                            </p:childTnLst>
-                          </p:cTn>
-                        </p:par>
-                      </p:childTnLst>
-                    </p:cTn>
-                  </p:par>
-                  <p:par>
-                    <p:cTn id="22" fill="hold">
-                      <p:stCondLst>
-                        <p:cond delay="indefinite"/>
-                      </p:stCondLst>
-                      <p:childTnLst>
-                        <p:par>
-                          <p:cTn id="23" fill="hold">
-                            <p:stCondLst>
-                              <p:cond delay="0"/>
-                            </p:stCondLst>
-                            <p:childTnLst>
-                              <p:par>
-                                <p:cTn id="24" presetID="42" presetClass="entr" presetSubtype="0" fill="hold" grpId="0" nodeType="clickEffect">
-                                  <p:stCondLst>
-                                    <p:cond delay="0"/>
-                                  </p:stCondLst>
-                                  <p:childTnLst>
-                                    <p:set>
-                                      <p:cBhvr>
-                                        <p:cTn id="25" dur="1" fill="hold">
-                                          <p:stCondLst>
-                                            <p:cond delay="0"/>
-                                          </p:stCondLst>
-                                        </p:cTn>
-                                        <p:tgtEl>
-                                          <p:spTgt spid="6"/>
-                                        </p:tgtEl>
-                                        <p:attrNameLst>
-                                          <p:attrName>style.visibility</p:attrName>
-                                        </p:attrNameLst>
-                                      </p:cBhvr>
-                                      <p:to>
-                                        <p:strVal val="visible"/>
-                                      </p:to>
-                                    </p:set>
-                                    <p:animEffect transition="in" filter="fade">
-                                      <p:cBhvr>
-                                        <p:cTn id="26" dur="1000"/>
-                                        <p:tgtEl>
-                                          <p:spTgt spid="6"/>
-                                        </p:tgtEl>
-                                      </p:cBhvr>
-                                    </p:animEffect>
-                                    <p:anim calcmode="lin" valueType="num">
-                                      <p:cBhvr>
-                                        <p:cTn id="27" dur="1000" fill="hold"/>
-                                        <p:tgtEl>
-                                          <p:spTgt spid="6"/>
-                                        </p:tgtEl>
-                                        <p:attrNameLst>
-                                          <p:attrName>ppt_x</p:attrName>
-                                        </p:attrNameLst>
-                                      </p:cBhvr>
-                                      <p:tavLst>
-                                        <p:tav tm="0">
-                                          <p:val>
-                                            <p:strVal val="#ppt_x"/>
-                                          </p:val>
-                                        </p:tav>
-                                        <p:tav tm="100000">
-                                          <p:val>
-                                            <p:strVal val="#ppt_x"/>
-                                          </p:val>
-                                        </p:tav>
-                                      </p:tavLst>
-                                    </p:anim>
-                                    <p:anim calcmode="lin" valueType="num">
-                                      <p:cBhvr>
-                                        <p:cTn id="28" dur="1000" fill="hold"/>
-                                        <p:tgtEl>
-                                          <p:spTgt spid="6"/>
-                                        </p:tgtEl>
-                                        <p:attrNameLst>
-                                          <p:attrName>ppt_y</p:attrName>
-                                        </p:attrNameLst>
-                                      </p:cBhvr>
-                                      <p:tavLst>
-                                        <p:tav tm="0">
-                                          <p:val>
-                                            <p:strVal val="#ppt_y+.1"/>
-                                          </p:val>
-                                        </p:tav>
-                                        <p:tav tm="100000">
-                                          <p:val>
-                                            <p:strVal val="#ppt_y"/>
-                                          </p:val>
-                                        </p:tav>
-                                      </p:tavLst>
-                                    </p:anim>
-                                  </p:childTnLst>
-                                </p:cTn>
-                              </p:par>
-                              <p:par>
-                                <p:cTn id="29" presetID="42" presetClass="entr" presetSubtype="0" fill="hold" nodeType="withEffect">
-                                  <p:stCondLst>
-                                    <p:cond delay="0"/>
-                                  </p:stCondLst>
-                                  <p:childTnLst>
-                                    <p:set>
-                                      <p:cBhvr>
-                                        <p:cTn id="30" dur="1" fill="hold">
-                                          <p:stCondLst>
-                                            <p:cond delay="0"/>
-                                          </p:stCondLst>
-                                        </p:cTn>
-                                        <p:tgtEl>
-                                          <p:spTgt spid="25"/>
-                                        </p:tgtEl>
-                                        <p:attrNameLst>
-                                          <p:attrName>style.visibility</p:attrName>
-                                        </p:attrNameLst>
-                                      </p:cBhvr>
-                                      <p:to>
-                                        <p:strVal val="visible"/>
-                                      </p:to>
-                                    </p:set>
-                                    <p:animEffect transition="in" filter="fade">
-                                      <p:cBhvr>
-                                        <p:cTn id="31" dur="1000"/>
-                                        <p:tgtEl>
-                                          <p:spTgt spid="25"/>
-                                        </p:tgtEl>
-                                      </p:cBhvr>
-                                    </p:animEffect>
-                                    <p:anim calcmode="lin" valueType="num">
-                                      <p:cBhvr>
-                                        <p:cTn id="32" dur="1000" fill="hold"/>
-                                        <p:tgtEl>
-                                          <p:spTgt spid="25"/>
-                                        </p:tgtEl>
-                                        <p:attrNameLst>
-                                          <p:attrName>ppt_x</p:attrName>
-                                        </p:attrNameLst>
-                                      </p:cBhvr>
-                                      <p:tavLst>
-                                        <p:tav tm="0">
-                                          <p:val>
-                                            <p:strVal val="#ppt_x"/>
-                                          </p:val>
-                                        </p:tav>
-                                        <p:tav tm="100000">
-                                          <p:val>
-                                            <p:strVal val="#ppt_x"/>
-                                          </p:val>
-                                        </p:tav>
-                                      </p:tavLst>
-                                    </p:anim>
-                                    <p:anim calcmode="lin" valueType="num">
-                                      <p:cBhvr>
-                                        <p:cTn id="33" dur="1000" fill="hold"/>
-                                        <p:tgtEl>
-                                          <p:spTgt spid="25"/>
-                                        </p:tgtEl>
-                                        <p:attrNameLst>
-                                          <p:attrName>ppt_y</p:attrName>
-                                        </p:attrNameLst>
-                                      </p:cBhvr>
-                                      <p:tavLst>
-                                        <p:tav tm="0">
-                                          <p:val>
-                                            <p:strVal val="#ppt_y+.1"/>
-                                          </p:val>
-                                        </p:tav>
-                                        <p:tav tm="100000">
-                                          <p:val>
-                                            <p:strVal val="#ppt_y"/>
-                                          </p:val>
-                                        </p:tav>
-                                      </p:tavLst>
-                                    </p:anim>
-                                  </p:childTnLst>
-                                </p:cTn>
-                              </p:par>
-                            </p:childTnLst>
-                          </p:cTn>
-                        </p:par>
-                      </p:childTnLst>
-                    </p:cTn>
-                  </p:par>
-                  <p:par>
-                    <p:cTn id="34" fill="hold">
-                      <p:stCondLst>
-                        <p:cond delay="indefinite"/>
-                      </p:stCondLst>
-                      <p:childTnLst>
-                        <p:par>
-                          <p:cTn id="35" fill="hold">
-                            <p:stCondLst>
-                              <p:cond delay="0"/>
-                            </p:stCondLst>
-                            <p:childTnLst>
-                              <p:par>
-                                <p:cTn id="36" presetID="42" presetClass="entr" presetSubtype="0" fill="hold" grpId="0" nodeType="clickEffect">
-                                  <p:stCondLst>
-                                    <p:cond delay="0"/>
-                                  </p:stCondLst>
-                                  <p:childTnLst>
-                                    <p:set>
-                                      <p:cBhvr>
-                                        <p:cTn id="37" dur="1" fill="hold">
-                                          <p:stCondLst>
-                                            <p:cond delay="0"/>
-                                          </p:stCondLst>
-                                        </p:cTn>
-                                        <p:tgtEl>
-                                          <p:spTgt spid="7"/>
-                                        </p:tgtEl>
-                                        <p:attrNameLst>
-                                          <p:attrName>style.visibility</p:attrName>
-                                        </p:attrNameLst>
-                                      </p:cBhvr>
-                                      <p:to>
-                                        <p:strVal val="visible"/>
-                                      </p:to>
-                                    </p:set>
-                                    <p:animEffect transition="in" filter="fade">
-                                      <p:cBhvr>
-                                        <p:cTn id="38" dur="1000"/>
-                                        <p:tgtEl>
-                                          <p:spTgt spid="7"/>
-                                        </p:tgtEl>
-                                      </p:cBhvr>
-                                    </p:animEffect>
-                                    <p:anim calcmode="lin" valueType="num">
-                                      <p:cBhvr>
-                                        <p:cTn id="39" dur="1000" fill="hold"/>
-                                        <p:tgtEl>
-                                          <p:spTgt spid="7"/>
-                                        </p:tgtEl>
-                                        <p:attrNameLst>
-                                          <p:attrName>ppt_x</p:attrName>
-                                        </p:attrNameLst>
-                                      </p:cBhvr>
-                                      <p:tavLst>
-                                        <p:tav tm="0">
-                                          <p:val>
-                                            <p:strVal val="#ppt_x"/>
-                                          </p:val>
-                                        </p:tav>
-                                        <p:tav tm="100000">
-                                          <p:val>
-                                            <p:strVal val="#ppt_x"/>
-                                          </p:val>
-                                        </p:tav>
-                                      </p:tavLst>
-                                    </p:anim>
-                                    <p:anim calcmode="lin" valueType="num">
-                                      <p:cBhvr>
-                                        <p:cTn id="40" dur="1000" fill="hold"/>
-                                        <p:tgtEl>
-                                          <p:spTgt spid="7"/>
-                                        </p:tgtEl>
-                                        <p:attrNameLst>
-                                          <p:attrName>ppt_y</p:attrName>
-                                        </p:attrNameLst>
-                                      </p:cBhvr>
-                                      <p:tavLst>
-                                        <p:tav tm="0">
-                                          <p:val>
-                                            <p:strVal val="#ppt_y+.1"/>
-                                          </p:val>
-                                        </p:tav>
-                                        <p:tav tm="100000">
-                                          <p:val>
-                                            <p:strVal val="#ppt_y"/>
-                                          </p:val>
-                                        </p:tav>
-                                      </p:tavLst>
-                                    </p:anim>
-                                  </p:childTnLst>
-                                </p:cTn>
-                              </p:par>
-                              <p:par>
-                                <p:cTn id="41" presetID="42" presetClass="entr" presetSubtype="0" fill="hold" nodeType="withEffect">
-                                  <p:stCondLst>
-                                    <p:cond delay="0"/>
-                                  </p:stCondLst>
-                                  <p:childTnLst>
-                                    <p:set>
-                                      <p:cBhvr>
-                                        <p:cTn id="42" dur="1" fill="hold">
-                                          <p:stCondLst>
-                                            <p:cond delay="0"/>
-                                          </p:stCondLst>
-                                        </p:cTn>
-                                        <p:tgtEl>
-                                          <p:spTgt spid="4"/>
-                                        </p:tgtEl>
-                                        <p:attrNameLst>
-                                          <p:attrName>style.visibility</p:attrName>
-                                        </p:attrNameLst>
-                                      </p:cBhvr>
-                                      <p:to>
-                                        <p:strVal val="visible"/>
-                                      </p:to>
-                                    </p:set>
-                                    <p:animEffect transition="in" filter="fade">
-                                      <p:cBhvr>
-                                        <p:cTn id="43" dur="1000"/>
-                                        <p:tgtEl>
-                                          <p:spTgt spid="4"/>
-                                        </p:tgtEl>
-                                      </p:cBhvr>
-                                    </p:animEffect>
-                                    <p:anim calcmode="lin" valueType="num">
-                                      <p:cBhvr>
-                                        <p:cTn id="44" dur="1000" fill="hold"/>
-                                        <p:tgtEl>
-                                          <p:spTgt spid="4"/>
-                                        </p:tgtEl>
-                                        <p:attrNameLst>
-                                          <p:attrName>ppt_x</p:attrName>
-                                        </p:attrNameLst>
-                                      </p:cBhvr>
-                                      <p:tavLst>
-                                        <p:tav tm="0">
-                                          <p:val>
-                                            <p:strVal val="#ppt_x"/>
-                                          </p:val>
-                                        </p:tav>
-                                        <p:tav tm="100000">
-                                          <p:val>
-                                            <p:strVal val="#ppt_x"/>
-                                          </p:val>
-                                        </p:tav>
-                                      </p:tavLst>
-                                    </p:anim>
-                                    <p:anim calcmode="lin" valueType="num">
-                                      <p:cBhvr>
-                                        <p:cTn id="45" dur="1000" fill="hold"/>
-                                        <p:tgtEl>
-                                          <p:spTgt spid="4"/>
-                                        </p:tgtEl>
-                                        <p:attrNameLst>
-                                          <p:attrName>ppt_y</p:attrName>
-                                        </p:attrNameLst>
-                                      </p:cBhvr>
-                                      <p:tavLst>
-                                        <p:tav tm="0">
-                                          <p:val>
-                                            <p:strVal val="#ppt_y+.1"/>
-                                          </p:val>
-                                        </p:tav>
-                                        <p:tav tm="100000">
-                                          <p:val>
-                                            <p:strVal val="#ppt_y"/>
-                                          </p:val>
-                                        </p:tav>
-                                      </p:tavLst>
-                                    </p:anim>
-                                  </p:childTnLst>
-                                </p:cTn>
-                              </p:par>
-                            </p:childTnLst>
-                          </p:cTn>
-                        </p:par>
-                      </p:childTnLst>
-                    </p:cTn>
-                  </p:par>
-                  <p:par>
-                    <p:cTn id="46" fill="hold">
-                      <p:stCondLst>
-                        <p:cond delay="indefinite"/>
-                      </p:stCondLst>
-                      <p:childTnLst>
-                        <p:par>
-                          <p:cTn id="47" fill="hold">
-                            <p:stCondLst>
-                              <p:cond delay="0"/>
-                            </p:stCondLst>
-                            <p:childTnLst>
-                              <p:par>
-                                <p:cTn id="48" presetID="42" presetClass="entr" presetSubtype="0" fill="hold" grpId="0" nodeType="clickEffect">
-                                  <p:stCondLst>
-                                    <p:cond delay="0"/>
-                                  </p:stCondLst>
-                                  <p:childTnLst>
-                                    <p:set>
-                                      <p:cBhvr>
-                                        <p:cTn id="49" dur="1" fill="hold">
-                                          <p:stCondLst>
-                                            <p:cond delay="0"/>
-                                          </p:stCondLst>
-                                        </p:cTn>
-                                        <p:tgtEl>
-                                          <p:spTgt spid="11"/>
-                                        </p:tgtEl>
-                                        <p:attrNameLst>
-                                          <p:attrName>style.visibility</p:attrName>
-                                        </p:attrNameLst>
-                                      </p:cBhvr>
-                                      <p:to>
-                                        <p:strVal val="visible"/>
-                                      </p:to>
-                                    </p:set>
-                                    <p:animEffect transition="in" filter="fade">
-                                      <p:cBhvr>
-                                        <p:cTn id="50" dur="1000"/>
-                                        <p:tgtEl>
-                                          <p:spTgt spid="11"/>
-                                        </p:tgtEl>
-                                      </p:cBhvr>
-                                    </p:animEffect>
-                                    <p:anim calcmode="lin" valueType="num">
-                                      <p:cBhvr>
-                                        <p:cTn id="51" dur="1000" fill="hold"/>
-                                        <p:tgtEl>
-                                          <p:spTgt spid="11"/>
-                                        </p:tgtEl>
-                                        <p:attrNameLst>
-                                          <p:attrName>ppt_x</p:attrName>
-                                        </p:attrNameLst>
-                                      </p:cBhvr>
-                                      <p:tavLst>
-                                        <p:tav tm="0">
-                                          <p:val>
-                                            <p:strVal val="#ppt_x"/>
-                                          </p:val>
-                                        </p:tav>
-                                        <p:tav tm="100000">
-                                          <p:val>
-                                            <p:strVal val="#ppt_x"/>
-                                          </p:val>
-                                        </p:tav>
-                                      </p:tavLst>
-                                    </p:anim>
-                                    <p:anim calcmode="lin" valueType="num">
-                                      <p:cBhvr>
-                                        <p:cTn id="52" dur="1000" fill="hold"/>
-                                        <p:tgtEl>
-                                          <p:spTgt spid="11"/>
-                                        </p:tgtEl>
-                                        <p:attrNameLst>
-                                          <p:attrName>ppt_y</p:attrName>
-                                        </p:attrNameLst>
-                                      </p:cBhvr>
-                                      <p:tavLst>
-                                        <p:tav tm="0">
-                                          <p:val>
-                                            <p:strVal val="#ppt_y+.1"/>
-                                          </p:val>
-                                        </p:tav>
-                                        <p:tav tm="100000">
-                                          <p:val>
-                                            <p:strVal val="#ppt_y"/>
-                                          </p:val>
-                                        </p:tav>
-                                      </p:tavLst>
-                                    </p:anim>
-                                  </p:childTnLst>
-                                </p:cTn>
-                              </p:par>
-                              <p:par>
-                                <p:cTn id="53" presetID="42" presetClass="entr" presetSubtype="0" fill="hold" nodeType="withEffect">
-                                  <p:stCondLst>
-                                    <p:cond delay="0"/>
-                                  </p:stCondLst>
-                                  <p:childTnLst>
-                                    <p:set>
-                                      <p:cBhvr>
-                                        <p:cTn id="54" dur="1" fill="hold">
-                                          <p:stCondLst>
-                                            <p:cond delay="0"/>
-                                          </p:stCondLst>
-                                        </p:cTn>
-                                        <p:tgtEl>
-                                          <p:spTgt spid="35"/>
-                                        </p:tgtEl>
-                                        <p:attrNameLst>
-                                          <p:attrName>style.visibility</p:attrName>
-                                        </p:attrNameLst>
-                                      </p:cBhvr>
-                                      <p:to>
-                                        <p:strVal val="visible"/>
-                                      </p:to>
-                                    </p:set>
-                                    <p:animEffect transition="in" filter="fade">
-                                      <p:cBhvr>
-                                        <p:cTn id="55" dur="1000"/>
-                                        <p:tgtEl>
-                                          <p:spTgt spid="35"/>
-                                        </p:tgtEl>
-                                      </p:cBhvr>
-                                    </p:animEffect>
-                                    <p:anim calcmode="lin" valueType="num">
-                                      <p:cBhvr>
-                                        <p:cTn id="56" dur="1000" fill="hold"/>
-                                        <p:tgtEl>
-                                          <p:spTgt spid="35"/>
-                                        </p:tgtEl>
-                                        <p:attrNameLst>
-                                          <p:attrName>ppt_x</p:attrName>
-                                        </p:attrNameLst>
-                                      </p:cBhvr>
-                                      <p:tavLst>
-                                        <p:tav tm="0">
-                                          <p:val>
-                                            <p:strVal val="#ppt_x"/>
-                                          </p:val>
-                                        </p:tav>
-                                        <p:tav tm="100000">
-                                          <p:val>
-                                            <p:strVal val="#ppt_x"/>
-                                          </p:val>
-                                        </p:tav>
-                                      </p:tavLst>
-                                    </p:anim>
-                                    <p:anim calcmode="lin" valueType="num">
-                                      <p:cBhvr>
-                                        <p:cTn id="57" dur="1000" fill="hold"/>
-                                        <p:tgtEl>
-                                          <p:spTgt spid="35"/>
-                                        </p:tgtEl>
-                                        <p:attrNameLst>
-                                          <p:attrName>ppt_y</p:attrName>
-                                        </p:attrNameLst>
-                                      </p:cBhvr>
-                                      <p:tavLst>
-                                        <p:tav tm="0">
-                                          <p:val>
-                                            <p:strVal val="#ppt_y+.1"/>
-                                          </p:val>
-                                        </p:tav>
-                                        <p:tav tm="100000">
-                                          <p:val>
-                                            <p:strVal val="#ppt_y"/>
-                                          </p:val>
-                                        </p:tav>
-                                      </p:tavLst>
-                                    </p:anim>
-                                  </p:childTnLst>
-                                </p:cTn>
-                              </p:par>
-                            </p:childTnLst>
-                          </p:cTn>
-                        </p:par>
-                      </p:childTnLst>
-                    </p:cTn>
-                  </p:par>
-                </p:childTnLst>
-              </p:cTn>
-              <p:prevCondLst>
-                <p:cond evt="onPrev" delay="0">
-                  <p:tgtEl>
-                    <p:sldTgt/>
-                  </p:tgtEl>
-                </p:cond>
-              </p:prevCondLst>
-              <p:nextCondLst>
-                <p:cond evt="onNext" delay="0">
-                  <p:tgtEl>
-                    <p:sldTgt/>
-                  </p:tgtEl>
-                </p:cond>
-              </p:nextCondLst>
-            </p:seq>
-          </p:childTnLst>
-        </p:cTn>
-      </p:par>
-    </p:tnLst>
-    <p:bldLst>
-      <p:bldP spid="2" grpId="0"/>
-      <p:bldP spid="5" grpId="0"/>
-      <p:bldP spid="6" grpId="0"/>
-      <p:bldP spid="7" grpId="0"/>
-      <p:bldP spid="11" grpId="0"/>
-    </p:bldLst>
-  </p:timing>
 </p:sld>
 </file>
 

</xml_diff>

<commit_message>
Ajout du logiciel Photofiltre 7
</commit_message>
<xml_diff>
--- a/oral_projet/revue_2/diaporama_revue_2_dylan.pptx
+++ b/oral_projet/revue_2/diaporama_revue_2_dylan.pptx
@@ -15072,8 +15072,8 @@
         </p:nvSpPr>
         <p:spPr>
           <a:xfrm>
-            <a:off x="3362957" y="583565"/>
-            <a:ext cx="7253761" cy="769441"/>
+            <a:off x="3779870" y="479063"/>
+            <a:ext cx="4416185" cy="769441"/>
           </a:xfrm>
           <a:prstGeom prst="rect">
             <a:avLst/>
@@ -15941,8 +15941,8 @@
         </p:nvSpPr>
         <p:spPr>
           <a:xfrm>
-            <a:off x="2988527" y="691412"/>
-            <a:ext cx="6243927" cy="1446550"/>
+            <a:off x="3699957" y="465670"/>
+            <a:ext cx="4583494" cy="1446550"/>
           </a:xfrm>
           <a:prstGeom prst="rect">
             <a:avLst/>
@@ -15955,6 +15955,7 @@
           </a:bodyPr>
           <a:lstStyle/>
           <a:p>
+            <a:pPr algn="ctr"/>
             <a:r>
               <a:rPr lang="fr-FR" sz="4400" dirty="0">
                 <a:latin typeface="Berlin Sans FB" panose="020E0602020502020306" pitchFamily="34" charset="0"/>

</xml_diff>

<commit_message>
Ajout screen + prog
</commit_message>
<xml_diff>
--- a/oral_projet/revue_2/diaporama_revue_2_dylan.pptx
+++ b/oral_projet/revue_2/diaporama_revue_2_dylan.pptx
@@ -5,7 +5,7 @@
     <p:sldMasterId id="2147483648" r:id="rId1"/>
   </p:sldMasterIdLst>
   <p:notesMasterIdLst>
-    <p:notesMasterId r:id="rId16"/>
+    <p:notesMasterId r:id="rId17"/>
   </p:notesMasterIdLst>
   <p:sldIdLst>
     <p:sldId id="256" r:id="rId2"/>
@@ -18,10 +18,11 @@
     <p:sldId id="265" r:id="rId9"/>
     <p:sldId id="270" r:id="rId10"/>
     <p:sldId id="266" r:id="rId11"/>
-    <p:sldId id="260" r:id="rId12"/>
-    <p:sldId id="268" r:id="rId13"/>
+    <p:sldId id="268" r:id="rId12"/>
+    <p:sldId id="273" r:id="rId13"/>
     <p:sldId id="272" r:id="rId14"/>
-    <p:sldId id="271" r:id="rId15"/>
+    <p:sldId id="260" r:id="rId15"/>
+    <p:sldId id="271" r:id="rId16"/>
   </p:sldIdLst>
   <p:sldSz cx="12192000" cy="6858000"/>
   <p:notesSz cx="6858000" cy="9144000"/>
@@ -6682,12 +6683,352 @@
           </a:fontRef>
         </p:style>
       </p:cxnSp>
+      <p:pic>
+        <p:nvPicPr>
+          <p:cNvPr id="57" name="Image 56">
+            <a:extLst>
+              <a:ext uri="{FF2B5EF4-FFF2-40B4-BE49-F238E27FC236}">
+                <a16:creationId xmlns:a16="http://schemas.microsoft.com/office/drawing/2014/main" id="{12B16FB2-5844-4B92-AE69-9BAC858C22BB}"/>
+              </a:ext>
+            </a:extLst>
+          </p:cNvPr>
+          <p:cNvPicPr>
+            <a:picLocks noChangeAspect="1"/>
+          </p:cNvPicPr>
+          <p:nvPr/>
+        </p:nvPicPr>
+        <p:blipFill>
+          <a:blip r:embed="rId3">
+            <a:extLst>
+              <a:ext uri="{28A0092B-C50C-407E-A947-70E740481C1C}">
+                <a14:useLocalDpi xmlns:a14="http://schemas.microsoft.com/office/drawing/2010/main" val="0"/>
+              </a:ext>
+            </a:extLst>
+          </a:blip>
+          <a:stretch>
+            <a:fillRect/>
+          </a:stretch>
+        </p:blipFill>
+        <p:spPr>
+          <a:xfrm>
+            <a:off x="9681085" y="238153"/>
+            <a:ext cx="1802101" cy="569807"/>
+          </a:xfrm>
+          <a:prstGeom prst="rect">
+            <a:avLst/>
+          </a:prstGeom>
+        </p:spPr>
+      </p:pic>
+      <p:cxnSp>
+        <p:nvCxnSpPr>
+          <p:cNvPr id="58" name="Connecteur droit 57">
+            <a:extLst>
+              <a:ext uri="{FF2B5EF4-FFF2-40B4-BE49-F238E27FC236}">
+                <a16:creationId xmlns:a16="http://schemas.microsoft.com/office/drawing/2014/main" id="{01599350-F8B0-4FDC-B003-981189A8D654}"/>
+              </a:ext>
+            </a:extLst>
+          </p:cNvPr>
+          <p:cNvCxnSpPr>
+            <a:cxnSpLocks/>
+          </p:cNvCxnSpPr>
+          <p:nvPr/>
+        </p:nvCxnSpPr>
+        <p:spPr>
+          <a:xfrm>
+            <a:off x="2573222" y="454803"/>
+            <a:ext cx="6829482" cy="10398"/>
+          </a:xfrm>
+          <a:prstGeom prst="line">
+            <a:avLst/>
+          </a:prstGeom>
+        </p:spPr>
+        <p:style>
+          <a:lnRef idx="3">
+            <a:schemeClr val="dk1"/>
+          </a:lnRef>
+          <a:fillRef idx="0">
+            <a:schemeClr val="dk1"/>
+          </a:fillRef>
+          <a:effectRef idx="2">
+            <a:schemeClr val="dk1"/>
+          </a:effectRef>
+          <a:fontRef idx="minor">
+            <a:schemeClr val="tx1"/>
+          </a:fontRef>
+        </p:style>
+      </p:cxnSp>
+      <p:cxnSp>
+        <p:nvCxnSpPr>
+          <p:cNvPr id="59" name="Connecteur droit 58">
+            <a:extLst>
+              <a:ext uri="{FF2B5EF4-FFF2-40B4-BE49-F238E27FC236}">
+                <a16:creationId xmlns:a16="http://schemas.microsoft.com/office/drawing/2014/main" id="{BC6E6150-6054-4785-84EC-0C46D82034C2}"/>
+              </a:ext>
+            </a:extLst>
+          </p:cNvPr>
+          <p:cNvCxnSpPr>
+            <a:cxnSpLocks/>
+          </p:cNvCxnSpPr>
+          <p:nvPr/>
+        </p:nvCxnSpPr>
+        <p:spPr>
+          <a:xfrm>
+            <a:off x="738231" y="454803"/>
+            <a:ext cx="344203" cy="484764"/>
+          </a:xfrm>
+          <a:prstGeom prst="line">
+            <a:avLst/>
+          </a:prstGeom>
+        </p:spPr>
+        <p:style>
+          <a:lnRef idx="3">
+            <a:schemeClr val="dk1"/>
+          </a:lnRef>
+          <a:fillRef idx="0">
+            <a:schemeClr val="dk1"/>
+          </a:fillRef>
+          <a:effectRef idx="2">
+            <a:schemeClr val="dk1"/>
+          </a:effectRef>
+          <a:fontRef idx="minor">
+            <a:schemeClr val="tx1"/>
+          </a:fontRef>
+        </p:style>
+      </p:cxnSp>
+      <p:cxnSp>
+        <p:nvCxnSpPr>
+          <p:cNvPr id="60" name="Connecteur droit 59">
+            <a:extLst>
+              <a:ext uri="{FF2B5EF4-FFF2-40B4-BE49-F238E27FC236}">
+                <a16:creationId xmlns:a16="http://schemas.microsoft.com/office/drawing/2014/main" id="{CBC9961A-8EC2-4287-A398-BCA4138D409D}"/>
+              </a:ext>
+            </a:extLst>
+          </p:cNvPr>
+          <p:cNvCxnSpPr>
+            <a:cxnSpLocks/>
+          </p:cNvCxnSpPr>
+          <p:nvPr/>
+        </p:nvCxnSpPr>
+        <p:spPr>
+          <a:xfrm>
+            <a:off x="1082434" y="938268"/>
+            <a:ext cx="1146585" cy="0"/>
+          </a:xfrm>
+          <a:prstGeom prst="line">
+            <a:avLst/>
+          </a:prstGeom>
+        </p:spPr>
+        <p:style>
+          <a:lnRef idx="3">
+            <a:schemeClr val="dk1"/>
+          </a:lnRef>
+          <a:fillRef idx="0">
+            <a:schemeClr val="dk1"/>
+          </a:fillRef>
+          <a:effectRef idx="2">
+            <a:schemeClr val="dk1"/>
+          </a:effectRef>
+          <a:fontRef idx="minor">
+            <a:schemeClr val="tx1"/>
+          </a:fontRef>
+        </p:style>
+      </p:cxnSp>
+      <p:cxnSp>
+        <p:nvCxnSpPr>
+          <p:cNvPr id="61" name="Connecteur droit 60">
+            <a:extLst>
+              <a:ext uri="{FF2B5EF4-FFF2-40B4-BE49-F238E27FC236}">
+                <a16:creationId xmlns:a16="http://schemas.microsoft.com/office/drawing/2014/main" id="{152B7C45-2543-4665-BC07-4DB71CA9F337}"/>
+              </a:ext>
+            </a:extLst>
+          </p:cNvPr>
+          <p:cNvCxnSpPr>
+            <a:cxnSpLocks/>
+          </p:cNvCxnSpPr>
+          <p:nvPr/>
+        </p:nvCxnSpPr>
+        <p:spPr>
+          <a:xfrm>
+            <a:off x="9402704" y="465201"/>
+            <a:ext cx="344203" cy="495163"/>
+          </a:xfrm>
+          <a:prstGeom prst="line">
+            <a:avLst/>
+          </a:prstGeom>
+        </p:spPr>
+        <p:style>
+          <a:lnRef idx="3">
+            <a:schemeClr val="dk1"/>
+          </a:lnRef>
+          <a:fillRef idx="0">
+            <a:schemeClr val="dk1"/>
+          </a:fillRef>
+          <a:effectRef idx="2">
+            <a:schemeClr val="dk1"/>
+          </a:effectRef>
+          <a:fontRef idx="minor">
+            <a:schemeClr val="tx1"/>
+          </a:fontRef>
+        </p:style>
+      </p:cxnSp>
+      <p:cxnSp>
+        <p:nvCxnSpPr>
+          <p:cNvPr id="62" name="Connecteur droit 61">
+            <a:extLst>
+              <a:ext uri="{FF2B5EF4-FFF2-40B4-BE49-F238E27FC236}">
+                <a16:creationId xmlns:a16="http://schemas.microsoft.com/office/drawing/2014/main" id="{00A84DC3-A112-46A3-B71C-04D85339323D}"/>
+              </a:ext>
+            </a:extLst>
+          </p:cNvPr>
+          <p:cNvCxnSpPr>
+            <a:cxnSpLocks/>
+          </p:cNvCxnSpPr>
+          <p:nvPr/>
+        </p:nvCxnSpPr>
+        <p:spPr>
+          <a:xfrm flipH="1">
+            <a:off x="11370469" y="448308"/>
+            <a:ext cx="364332" cy="501657"/>
+          </a:xfrm>
+          <a:prstGeom prst="line">
+            <a:avLst/>
+          </a:prstGeom>
+        </p:spPr>
+        <p:style>
+          <a:lnRef idx="3">
+            <a:schemeClr val="dk1"/>
+          </a:lnRef>
+          <a:fillRef idx="0">
+            <a:schemeClr val="dk1"/>
+          </a:fillRef>
+          <a:effectRef idx="2">
+            <a:schemeClr val="dk1"/>
+          </a:effectRef>
+          <a:fontRef idx="minor">
+            <a:schemeClr val="tx1"/>
+          </a:fontRef>
+        </p:style>
+      </p:cxnSp>
+      <p:cxnSp>
+        <p:nvCxnSpPr>
+          <p:cNvPr id="63" name="Connecteur droit 62">
+            <a:extLst>
+              <a:ext uri="{FF2B5EF4-FFF2-40B4-BE49-F238E27FC236}">
+                <a16:creationId xmlns:a16="http://schemas.microsoft.com/office/drawing/2014/main" id="{C50788C6-8F68-44EC-AB54-94C1D2FE554D}"/>
+              </a:ext>
+            </a:extLst>
+          </p:cNvPr>
+          <p:cNvCxnSpPr>
+            <a:cxnSpLocks/>
+          </p:cNvCxnSpPr>
+          <p:nvPr/>
+        </p:nvCxnSpPr>
+        <p:spPr>
+          <a:xfrm>
+            <a:off x="9743203" y="949965"/>
+            <a:ext cx="1627266" cy="0"/>
+          </a:xfrm>
+          <a:prstGeom prst="line">
+            <a:avLst/>
+          </a:prstGeom>
+        </p:spPr>
+        <p:style>
+          <a:lnRef idx="3">
+            <a:schemeClr val="dk1"/>
+          </a:lnRef>
+          <a:fillRef idx="0">
+            <a:schemeClr val="dk1"/>
+          </a:fillRef>
+          <a:effectRef idx="2">
+            <a:schemeClr val="dk1"/>
+          </a:effectRef>
+          <a:fontRef idx="minor">
+            <a:schemeClr val="tx1"/>
+          </a:fontRef>
+        </p:style>
+      </p:cxnSp>
+      <p:cxnSp>
+        <p:nvCxnSpPr>
+          <p:cNvPr id="64" name="Connecteur droit 63">
+            <a:extLst>
+              <a:ext uri="{FF2B5EF4-FFF2-40B4-BE49-F238E27FC236}">
+                <a16:creationId xmlns:a16="http://schemas.microsoft.com/office/drawing/2014/main" id="{BC4D4E5F-5636-45CB-873C-EC085AB307A3}"/>
+              </a:ext>
+            </a:extLst>
+          </p:cNvPr>
+          <p:cNvCxnSpPr>
+            <a:cxnSpLocks/>
+          </p:cNvCxnSpPr>
+          <p:nvPr/>
+        </p:nvCxnSpPr>
+        <p:spPr>
+          <a:xfrm>
+            <a:off x="11715750" y="454801"/>
+            <a:ext cx="476249" cy="10400"/>
+          </a:xfrm>
+          <a:prstGeom prst="line">
+            <a:avLst/>
+          </a:prstGeom>
+        </p:spPr>
+        <p:style>
+          <a:lnRef idx="3">
+            <a:schemeClr val="dk1"/>
+          </a:lnRef>
+          <a:fillRef idx="0">
+            <a:schemeClr val="dk1"/>
+          </a:fillRef>
+          <a:effectRef idx="2">
+            <a:schemeClr val="dk1"/>
+          </a:effectRef>
+          <a:fontRef idx="minor">
+            <a:schemeClr val="tx1"/>
+          </a:fontRef>
+        </p:style>
+      </p:cxnSp>
+      <p:cxnSp>
+        <p:nvCxnSpPr>
+          <p:cNvPr id="65" name="Connecteur droit 64">
+            <a:extLst>
+              <a:ext uri="{FF2B5EF4-FFF2-40B4-BE49-F238E27FC236}">
+                <a16:creationId xmlns:a16="http://schemas.microsoft.com/office/drawing/2014/main" id="{E6F6B4C5-0E3B-46C9-859D-EE774175D36F}"/>
+              </a:ext>
+            </a:extLst>
+          </p:cNvPr>
+          <p:cNvCxnSpPr>
+            <a:cxnSpLocks/>
+          </p:cNvCxnSpPr>
+          <p:nvPr/>
+        </p:nvCxnSpPr>
+        <p:spPr>
+          <a:xfrm flipH="1">
+            <a:off x="2216372" y="446356"/>
+            <a:ext cx="364332" cy="501657"/>
+          </a:xfrm>
+          <a:prstGeom prst="line">
+            <a:avLst/>
+          </a:prstGeom>
+        </p:spPr>
+        <p:style>
+          <a:lnRef idx="3">
+            <a:schemeClr val="dk1"/>
+          </a:lnRef>
+          <a:fillRef idx="0">
+            <a:schemeClr val="dk1"/>
+          </a:fillRef>
+          <a:effectRef idx="2">
+            <a:schemeClr val="dk1"/>
+          </a:effectRef>
+          <a:fontRef idx="minor">
+            <a:schemeClr val="tx1"/>
+          </a:fontRef>
+        </p:style>
+      </p:cxnSp>
       <p:sp>
         <p:nvSpPr>
-          <p:cNvPr id="3" name="ZoneTexte 2">
-            <a:extLst>
-              <a:ext uri="{FF2B5EF4-FFF2-40B4-BE49-F238E27FC236}">
-                <a16:creationId xmlns:a16="http://schemas.microsoft.com/office/drawing/2014/main" id="{DCCD1615-1755-47F7-AF0B-75E932931245}"/>
+          <p:cNvPr id="2" name="ZoneTexte 1">
+            <a:extLst>
+              <a:ext uri="{FF2B5EF4-FFF2-40B4-BE49-F238E27FC236}">
+                <a16:creationId xmlns:a16="http://schemas.microsoft.com/office/drawing/2014/main" id="{128A5370-27C5-4A3F-98D7-D74D075851FE}"/>
               </a:ext>
             </a:extLst>
           </p:cNvPr>
@@ -6696,43 +7037,8 @@
         </p:nvSpPr>
         <p:spPr>
           <a:xfrm>
-            <a:off x="1156800" y="3143689"/>
-            <a:ext cx="2695434" cy="646331"/>
-          </a:xfrm>
-          <a:prstGeom prst="rect">
-            <a:avLst/>
-          </a:prstGeom>
-          <a:noFill/>
-        </p:spPr>
-        <p:txBody>
-          <a:bodyPr wrap="square" rtlCol="0">
-            <a:spAutoFit/>
-          </a:bodyPr>
-          <a:lstStyle/>
-          <a:p>
-            <a:endParaRPr lang="fr-FR" dirty="0"/>
-          </a:p>
-          <a:p>
-            <a:endParaRPr lang="fr-FR" dirty="0"/>
-          </a:p>
-        </p:txBody>
-      </p:sp>
-      <p:sp>
-        <p:nvSpPr>
-          <p:cNvPr id="9" name="ZoneTexte 8">
-            <a:extLst>
-              <a:ext uri="{FF2B5EF4-FFF2-40B4-BE49-F238E27FC236}">
-                <a16:creationId xmlns:a16="http://schemas.microsoft.com/office/drawing/2014/main" id="{82010251-0AD2-4DAA-8E6B-7CA6A2301A9E}"/>
-              </a:ext>
-            </a:extLst>
-          </p:cNvPr>
-          <p:cNvSpPr txBox="1"/>
-          <p:nvPr/>
-        </p:nvSpPr>
-        <p:spPr>
-          <a:xfrm>
-            <a:off x="3779870" y="479063"/>
-            <a:ext cx="4416185" cy="769441"/>
+            <a:off x="3813920" y="465793"/>
+            <a:ext cx="4355567" cy="769441"/>
           </a:xfrm>
           <a:prstGeom prst="rect">
             <a:avLst/>
@@ -6749,7 +7055,2483 @@
               <a:rPr lang="fr-FR" sz="4400" dirty="0">
                 <a:latin typeface="Berlin Sans FB" panose="020E0602020502020306" pitchFamily="34" charset="0"/>
               </a:rPr>
-              <a:t>Partie Personnelle</a:t>
+              <a:t>Solutions trouvées</a:t>
+            </a:r>
+          </a:p>
+        </p:txBody>
+      </p:sp>
+      <p:sp>
+        <p:nvSpPr>
+          <p:cNvPr id="7" name="ZoneTexte 6">
+            <a:extLst>
+              <a:ext uri="{FF2B5EF4-FFF2-40B4-BE49-F238E27FC236}">
+                <a16:creationId xmlns:a16="http://schemas.microsoft.com/office/drawing/2014/main" id="{F5143EC5-EF8B-4615-B050-3E12BF28AC28}"/>
+              </a:ext>
+            </a:extLst>
+          </p:cNvPr>
+          <p:cNvSpPr txBox="1"/>
+          <p:nvPr/>
+        </p:nvSpPr>
+        <p:spPr>
+          <a:xfrm>
+            <a:off x="4329183" y="1235234"/>
+            <a:ext cx="3317559" cy="523220"/>
+          </a:xfrm>
+          <a:prstGeom prst="rect">
+            <a:avLst/>
+          </a:prstGeom>
+          <a:noFill/>
+        </p:spPr>
+        <p:txBody>
+          <a:bodyPr wrap="square" rtlCol="0">
+            <a:spAutoFit/>
+          </a:bodyPr>
+          <a:lstStyle/>
+          <a:p>
+            <a:r>
+              <a:rPr lang="fr-FR" sz="2800" dirty="0"/>
+              <a:t>Partie 1 : Pluviomètre</a:t>
+            </a:r>
+          </a:p>
+        </p:txBody>
+      </p:sp>
+      <p:sp>
+        <p:nvSpPr>
+          <p:cNvPr id="3" name="Rectangle 2">
+            <a:extLst>
+              <a:ext uri="{FF2B5EF4-FFF2-40B4-BE49-F238E27FC236}">
+                <a16:creationId xmlns:a16="http://schemas.microsoft.com/office/drawing/2014/main" id="{17BC4C2F-C935-426A-A7C3-E9AC84E9E20B}"/>
+              </a:ext>
+            </a:extLst>
+          </p:cNvPr>
+          <p:cNvSpPr/>
+          <p:nvPr/>
+        </p:nvSpPr>
+        <p:spPr>
+          <a:xfrm>
+            <a:off x="1191540" y="2986480"/>
+            <a:ext cx="2273416" cy="2298584"/>
+          </a:xfrm>
+          <a:prstGeom prst="rect">
+            <a:avLst/>
+          </a:prstGeom>
+          <a:noFill/>
+          <a:ln>
+            <a:solidFill>
+              <a:schemeClr val="tx1"/>
+            </a:solidFill>
+            <a:prstDash val="dash"/>
+          </a:ln>
+        </p:spPr>
+        <p:style>
+          <a:lnRef idx="2">
+            <a:schemeClr val="accent1">
+              <a:shade val="50000"/>
+            </a:schemeClr>
+          </a:lnRef>
+          <a:fillRef idx="1">
+            <a:schemeClr val="accent1"/>
+          </a:fillRef>
+          <a:effectRef idx="0">
+            <a:schemeClr val="accent1"/>
+          </a:effectRef>
+          <a:fontRef idx="minor">
+            <a:schemeClr val="lt1"/>
+          </a:fontRef>
+        </p:style>
+        <p:txBody>
+          <a:bodyPr rtlCol="0" anchor="ctr"/>
+          <a:lstStyle/>
+          <a:p>
+            <a:pPr algn="ctr"/>
+            <a:endParaRPr lang="fr-FR"/>
+          </a:p>
+        </p:txBody>
+      </p:sp>
+      <p:sp>
+        <p:nvSpPr>
+          <p:cNvPr id="4" name="ZoneTexte 3">
+            <a:extLst>
+              <a:ext uri="{FF2B5EF4-FFF2-40B4-BE49-F238E27FC236}">
+                <a16:creationId xmlns:a16="http://schemas.microsoft.com/office/drawing/2014/main" id="{BDF4EB06-8F6B-4DCB-A224-2CBD13B28178}"/>
+              </a:ext>
+            </a:extLst>
+          </p:cNvPr>
+          <p:cNvSpPr txBox="1"/>
+          <p:nvPr/>
+        </p:nvSpPr>
+        <p:spPr>
+          <a:xfrm>
+            <a:off x="1191540" y="2678703"/>
+            <a:ext cx="761747" cy="307777"/>
+          </a:xfrm>
+          <a:prstGeom prst="rect">
+            <a:avLst/>
+          </a:prstGeom>
+          <a:noFill/>
+        </p:spPr>
+        <p:txBody>
+          <a:bodyPr wrap="none" rtlCol="0">
+            <a:spAutoFit/>
+          </a:bodyPr>
+          <a:lstStyle/>
+          <a:p>
+            <a:r>
+              <a:rPr lang="fr-FR" sz="1400" i="1" dirty="0"/>
+              <a:t>Arduino</a:t>
+            </a:r>
+          </a:p>
+        </p:txBody>
+      </p:sp>
+      <p:sp>
+        <p:nvSpPr>
+          <p:cNvPr id="5" name="Rectangle 4">
+            <a:extLst>
+              <a:ext uri="{FF2B5EF4-FFF2-40B4-BE49-F238E27FC236}">
+                <a16:creationId xmlns:a16="http://schemas.microsoft.com/office/drawing/2014/main" id="{A44D7473-AD23-425A-8BB7-E5E7AAFD2B0B}"/>
+              </a:ext>
+            </a:extLst>
+          </p:cNvPr>
+          <p:cNvSpPr/>
+          <p:nvPr/>
+        </p:nvSpPr>
+        <p:spPr>
+          <a:xfrm>
+            <a:off x="2984143" y="3289183"/>
+            <a:ext cx="251670" cy="497005"/>
+          </a:xfrm>
+          <a:prstGeom prst="rect">
+            <a:avLst/>
+          </a:prstGeom>
+          <a:noFill/>
+          <a:ln>
+            <a:solidFill>
+              <a:schemeClr val="tx1"/>
+            </a:solidFill>
+          </a:ln>
+        </p:spPr>
+        <p:style>
+          <a:lnRef idx="2">
+            <a:schemeClr val="accent1">
+              <a:shade val="50000"/>
+            </a:schemeClr>
+          </a:lnRef>
+          <a:fillRef idx="1">
+            <a:schemeClr val="accent1"/>
+          </a:fillRef>
+          <a:effectRef idx="0">
+            <a:schemeClr val="accent1"/>
+          </a:effectRef>
+          <a:fontRef idx="minor">
+            <a:schemeClr val="lt1"/>
+          </a:fontRef>
+        </p:style>
+        <p:txBody>
+          <a:bodyPr rtlCol="0" anchor="ctr"/>
+          <a:lstStyle/>
+          <a:p>
+            <a:pPr algn="ctr"/>
+            <a:endParaRPr lang="fr-FR"/>
+          </a:p>
+        </p:txBody>
+      </p:sp>
+      <p:cxnSp>
+        <p:nvCxnSpPr>
+          <p:cNvPr id="9" name="Connecteur : en angle 8">
+            <a:extLst>
+              <a:ext uri="{FF2B5EF4-FFF2-40B4-BE49-F238E27FC236}">
+                <a16:creationId xmlns:a16="http://schemas.microsoft.com/office/drawing/2014/main" id="{F1CFBB48-9513-4EAB-BB0F-25BA29E5302E}"/>
+              </a:ext>
+            </a:extLst>
+          </p:cNvPr>
+          <p:cNvCxnSpPr>
+            <a:cxnSpLocks/>
+          </p:cNvCxnSpPr>
+          <p:nvPr/>
+        </p:nvCxnSpPr>
+        <p:spPr>
+          <a:xfrm flipV="1">
+            <a:off x="3107531" y="2733675"/>
+            <a:ext cx="2717007" cy="640556"/>
+          </a:xfrm>
+          <a:prstGeom prst="bentConnector3">
+            <a:avLst/>
+          </a:prstGeom>
+          <a:ln w="12700">
+            <a:solidFill>
+              <a:srgbClr val="FF0000"/>
+            </a:solidFill>
+          </a:ln>
+        </p:spPr>
+        <p:style>
+          <a:lnRef idx="1">
+            <a:schemeClr val="accent1"/>
+          </a:lnRef>
+          <a:fillRef idx="0">
+            <a:schemeClr val="accent1"/>
+          </a:fillRef>
+          <a:effectRef idx="0">
+            <a:schemeClr val="accent1"/>
+          </a:effectRef>
+          <a:fontRef idx="minor">
+            <a:schemeClr val="tx1"/>
+          </a:fontRef>
+        </p:style>
+      </p:cxnSp>
+      <p:cxnSp>
+        <p:nvCxnSpPr>
+          <p:cNvPr id="17" name="Connecteur : en angle 16">
+            <a:extLst>
+              <a:ext uri="{FF2B5EF4-FFF2-40B4-BE49-F238E27FC236}">
+                <a16:creationId xmlns:a16="http://schemas.microsoft.com/office/drawing/2014/main" id="{33CAEBEE-74C6-4159-B203-D01991F85AE6}"/>
+              </a:ext>
+            </a:extLst>
+          </p:cNvPr>
+          <p:cNvCxnSpPr>
+            <a:cxnSpLocks/>
+          </p:cNvCxnSpPr>
+          <p:nvPr/>
+        </p:nvCxnSpPr>
+        <p:spPr>
+          <a:xfrm>
+            <a:off x="3105150" y="3707606"/>
+            <a:ext cx="2200274" cy="854870"/>
+          </a:xfrm>
+          <a:prstGeom prst="bentConnector3">
+            <a:avLst/>
+          </a:prstGeom>
+          <a:ln w="12700">
+            <a:solidFill>
+              <a:srgbClr val="00B050"/>
+            </a:solidFill>
+          </a:ln>
+        </p:spPr>
+        <p:style>
+          <a:lnRef idx="1">
+            <a:schemeClr val="accent1"/>
+          </a:lnRef>
+          <a:fillRef idx="0">
+            <a:schemeClr val="accent1"/>
+          </a:fillRef>
+          <a:effectRef idx="0">
+            <a:schemeClr val="accent1"/>
+          </a:effectRef>
+          <a:fontRef idx="minor">
+            <a:schemeClr val="tx1"/>
+          </a:fontRef>
+        </p:style>
+      </p:cxnSp>
+      <p:sp>
+        <p:nvSpPr>
+          <p:cNvPr id="18" name="Rectangle 17">
+            <a:extLst>
+              <a:ext uri="{FF2B5EF4-FFF2-40B4-BE49-F238E27FC236}">
+                <a16:creationId xmlns:a16="http://schemas.microsoft.com/office/drawing/2014/main" id="{6BBD3A86-2D6C-45BB-89EE-C15041DE7521}"/>
+              </a:ext>
+            </a:extLst>
+          </p:cNvPr>
+          <p:cNvSpPr/>
+          <p:nvPr/>
+        </p:nvSpPr>
+        <p:spPr>
+          <a:xfrm>
+            <a:off x="5149423" y="2986481"/>
+            <a:ext cx="1830497" cy="1326440"/>
+          </a:xfrm>
+          <a:prstGeom prst="rect">
+            <a:avLst/>
+          </a:prstGeom>
+          <a:noFill/>
+          <a:ln>
+            <a:solidFill>
+              <a:schemeClr val="tx1"/>
+            </a:solidFill>
+            <a:prstDash val="dash"/>
+          </a:ln>
+        </p:spPr>
+        <p:style>
+          <a:lnRef idx="2">
+            <a:schemeClr val="accent1">
+              <a:shade val="50000"/>
+            </a:schemeClr>
+          </a:lnRef>
+          <a:fillRef idx="1">
+            <a:schemeClr val="accent1"/>
+          </a:fillRef>
+          <a:effectRef idx="0">
+            <a:schemeClr val="accent1"/>
+          </a:effectRef>
+          <a:fontRef idx="minor">
+            <a:schemeClr val="lt1"/>
+          </a:fontRef>
+        </p:style>
+        <p:txBody>
+          <a:bodyPr rtlCol="0" anchor="ctr"/>
+          <a:lstStyle/>
+          <a:p>
+            <a:pPr algn="ctr"/>
+            <a:endParaRPr lang="fr-FR"/>
+          </a:p>
+        </p:txBody>
+      </p:sp>
+      <p:sp>
+        <p:nvSpPr>
+          <p:cNvPr id="19" name="Rectangle 18">
+            <a:extLst>
+              <a:ext uri="{FF2B5EF4-FFF2-40B4-BE49-F238E27FC236}">
+                <a16:creationId xmlns:a16="http://schemas.microsoft.com/office/drawing/2014/main" id="{A6FE6620-AA40-4E40-B49C-80290E2E1D04}"/>
+              </a:ext>
+            </a:extLst>
+          </p:cNvPr>
+          <p:cNvSpPr/>
+          <p:nvPr/>
+        </p:nvSpPr>
+        <p:spPr>
+          <a:xfrm>
+            <a:off x="5596279" y="3342519"/>
+            <a:ext cx="936784" cy="614363"/>
+          </a:xfrm>
+          <a:prstGeom prst="rect">
+            <a:avLst/>
+          </a:prstGeom>
+          <a:noFill/>
+          <a:ln>
+            <a:solidFill>
+              <a:schemeClr val="tx1"/>
+            </a:solidFill>
+          </a:ln>
+        </p:spPr>
+        <p:style>
+          <a:lnRef idx="2">
+            <a:schemeClr val="accent1">
+              <a:shade val="50000"/>
+            </a:schemeClr>
+          </a:lnRef>
+          <a:fillRef idx="1">
+            <a:schemeClr val="accent1"/>
+          </a:fillRef>
+          <a:effectRef idx="0">
+            <a:schemeClr val="accent1"/>
+          </a:effectRef>
+          <a:fontRef idx="minor">
+            <a:schemeClr val="lt1"/>
+          </a:fontRef>
+        </p:style>
+        <p:txBody>
+          <a:bodyPr rtlCol="0" anchor="ctr"/>
+          <a:lstStyle/>
+          <a:p>
+            <a:pPr algn="ctr"/>
+            <a:endParaRPr lang="fr-FR"/>
+          </a:p>
+        </p:txBody>
+      </p:sp>
+      <p:sp>
+        <p:nvSpPr>
+          <p:cNvPr id="21" name="Rectangle 20">
+            <a:extLst>
+              <a:ext uri="{FF2B5EF4-FFF2-40B4-BE49-F238E27FC236}">
+                <a16:creationId xmlns:a16="http://schemas.microsoft.com/office/drawing/2014/main" id="{841219D3-407B-412D-9708-AC9AD0CE074A}"/>
+              </a:ext>
+            </a:extLst>
+          </p:cNvPr>
+          <p:cNvSpPr/>
+          <p:nvPr/>
+        </p:nvSpPr>
+        <p:spPr>
+          <a:xfrm>
+            <a:off x="5203031" y="4005263"/>
+            <a:ext cx="428625" cy="261937"/>
+          </a:xfrm>
+          <a:prstGeom prst="rect">
+            <a:avLst/>
+          </a:prstGeom>
+          <a:noFill/>
+          <a:ln>
+            <a:solidFill>
+              <a:schemeClr val="tx1"/>
+            </a:solidFill>
+          </a:ln>
+        </p:spPr>
+        <p:style>
+          <a:lnRef idx="2">
+            <a:schemeClr val="accent1">
+              <a:shade val="50000"/>
+            </a:schemeClr>
+          </a:lnRef>
+          <a:fillRef idx="1">
+            <a:schemeClr val="accent1"/>
+          </a:fillRef>
+          <a:effectRef idx="0">
+            <a:schemeClr val="accent1"/>
+          </a:effectRef>
+          <a:fontRef idx="minor">
+            <a:schemeClr val="lt1"/>
+          </a:fontRef>
+        </p:style>
+        <p:txBody>
+          <a:bodyPr rtlCol="0" anchor="ctr"/>
+          <a:lstStyle/>
+          <a:p>
+            <a:pPr algn="ctr"/>
+            <a:endParaRPr lang="fr-FR"/>
+          </a:p>
+        </p:txBody>
+      </p:sp>
+      <p:sp>
+        <p:nvSpPr>
+          <p:cNvPr id="38" name="Rectangle 37">
+            <a:extLst>
+              <a:ext uri="{FF2B5EF4-FFF2-40B4-BE49-F238E27FC236}">
+                <a16:creationId xmlns:a16="http://schemas.microsoft.com/office/drawing/2014/main" id="{6344E4E7-7B37-4FF8-9DDB-4A315C76C229}"/>
+              </a:ext>
+            </a:extLst>
+          </p:cNvPr>
+          <p:cNvSpPr/>
+          <p:nvPr/>
+        </p:nvSpPr>
+        <p:spPr>
+          <a:xfrm>
+            <a:off x="5501029" y="3040495"/>
+            <a:ext cx="428625" cy="261937"/>
+          </a:xfrm>
+          <a:prstGeom prst="rect">
+            <a:avLst/>
+          </a:prstGeom>
+          <a:noFill/>
+          <a:ln>
+            <a:solidFill>
+              <a:schemeClr val="tx1"/>
+            </a:solidFill>
+          </a:ln>
+        </p:spPr>
+        <p:style>
+          <a:lnRef idx="2">
+            <a:schemeClr val="accent1">
+              <a:shade val="50000"/>
+            </a:schemeClr>
+          </a:lnRef>
+          <a:fillRef idx="1">
+            <a:schemeClr val="accent1"/>
+          </a:fillRef>
+          <a:effectRef idx="0">
+            <a:schemeClr val="accent1"/>
+          </a:effectRef>
+          <a:fontRef idx="minor">
+            <a:schemeClr val="lt1"/>
+          </a:fontRef>
+        </p:style>
+        <p:txBody>
+          <a:bodyPr rtlCol="0" anchor="ctr"/>
+          <a:lstStyle/>
+          <a:p>
+            <a:pPr algn="ctr"/>
+            <a:endParaRPr lang="fr-FR"/>
+          </a:p>
+        </p:txBody>
+      </p:sp>
+      <p:cxnSp>
+        <p:nvCxnSpPr>
+          <p:cNvPr id="24" name="Connecteur droit 23">
+            <a:extLst>
+              <a:ext uri="{FF2B5EF4-FFF2-40B4-BE49-F238E27FC236}">
+                <a16:creationId xmlns:a16="http://schemas.microsoft.com/office/drawing/2014/main" id="{166F9897-520E-43FA-8A7C-9B59D9502627}"/>
+              </a:ext>
+            </a:extLst>
+          </p:cNvPr>
+          <p:cNvCxnSpPr>
+            <a:stCxn id="21" idx="0"/>
+            <a:endCxn id="21" idx="2"/>
+          </p:cNvCxnSpPr>
+          <p:nvPr/>
+        </p:nvCxnSpPr>
+        <p:spPr>
+          <a:xfrm>
+            <a:off x="5417344" y="4005263"/>
+            <a:ext cx="0" cy="261937"/>
+          </a:xfrm>
+          <a:prstGeom prst="line">
+            <a:avLst/>
+          </a:prstGeom>
+          <a:ln w="12700">
+            <a:solidFill>
+              <a:schemeClr val="tx1"/>
+            </a:solidFill>
+          </a:ln>
+        </p:spPr>
+        <p:style>
+          <a:lnRef idx="1">
+            <a:schemeClr val="accent1"/>
+          </a:lnRef>
+          <a:fillRef idx="0">
+            <a:schemeClr val="accent1"/>
+          </a:fillRef>
+          <a:effectRef idx="0">
+            <a:schemeClr val="accent1"/>
+          </a:effectRef>
+          <a:fontRef idx="minor">
+            <a:schemeClr val="tx1"/>
+          </a:fontRef>
+        </p:style>
+      </p:cxnSp>
+      <p:cxnSp>
+        <p:nvCxnSpPr>
+          <p:cNvPr id="27" name="Connecteur droit 26">
+            <a:extLst>
+              <a:ext uri="{FF2B5EF4-FFF2-40B4-BE49-F238E27FC236}">
+                <a16:creationId xmlns:a16="http://schemas.microsoft.com/office/drawing/2014/main" id="{25B6264B-391D-4F96-9FBF-4C3884A14710}"/>
+              </a:ext>
+            </a:extLst>
+          </p:cNvPr>
+          <p:cNvCxnSpPr>
+            <a:stCxn id="38" idx="0"/>
+            <a:endCxn id="38" idx="2"/>
+          </p:cNvCxnSpPr>
+          <p:nvPr/>
+        </p:nvCxnSpPr>
+        <p:spPr>
+          <a:xfrm>
+            <a:off x="5715342" y="3040495"/>
+            <a:ext cx="0" cy="261937"/>
+          </a:xfrm>
+          <a:prstGeom prst="line">
+            <a:avLst/>
+          </a:prstGeom>
+          <a:ln w="12700">
+            <a:solidFill>
+              <a:schemeClr val="tx1"/>
+            </a:solidFill>
+          </a:ln>
+        </p:spPr>
+        <p:style>
+          <a:lnRef idx="1">
+            <a:schemeClr val="accent1"/>
+          </a:lnRef>
+          <a:fillRef idx="0">
+            <a:schemeClr val="accent1"/>
+          </a:fillRef>
+          <a:effectRef idx="0">
+            <a:schemeClr val="accent1"/>
+          </a:effectRef>
+          <a:fontRef idx="minor">
+            <a:schemeClr val="tx1"/>
+          </a:fontRef>
+        </p:style>
+      </p:cxnSp>
+      <p:cxnSp>
+        <p:nvCxnSpPr>
+          <p:cNvPr id="33" name="Connecteur droit 32">
+            <a:extLst>
+              <a:ext uri="{FF2B5EF4-FFF2-40B4-BE49-F238E27FC236}">
+                <a16:creationId xmlns:a16="http://schemas.microsoft.com/office/drawing/2014/main" id="{C7899647-1A4C-4CC9-904C-8D5B739A0CD6}"/>
+              </a:ext>
+            </a:extLst>
+          </p:cNvPr>
+          <p:cNvCxnSpPr>
+            <a:cxnSpLocks/>
+          </p:cNvCxnSpPr>
+          <p:nvPr/>
+        </p:nvCxnSpPr>
+        <p:spPr>
+          <a:xfrm flipV="1">
+            <a:off x="5824538" y="2728913"/>
+            <a:ext cx="0" cy="437788"/>
+          </a:xfrm>
+          <a:prstGeom prst="line">
+            <a:avLst/>
+          </a:prstGeom>
+          <a:ln w="12700">
+            <a:solidFill>
+              <a:srgbClr val="FF0000"/>
+            </a:solidFill>
+          </a:ln>
+        </p:spPr>
+        <p:style>
+          <a:lnRef idx="1">
+            <a:schemeClr val="accent1"/>
+          </a:lnRef>
+          <a:fillRef idx="0">
+            <a:schemeClr val="accent1"/>
+          </a:fillRef>
+          <a:effectRef idx="0">
+            <a:schemeClr val="accent1"/>
+          </a:effectRef>
+          <a:fontRef idx="minor">
+            <a:schemeClr val="tx1"/>
+          </a:fontRef>
+        </p:style>
+      </p:cxnSp>
+      <p:cxnSp>
+        <p:nvCxnSpPr>
+          <p:cNvPr id="39" name="Connecteur droit 38">
+            <a:extLst>
+              <a:ext uri="{FF2B5EF4-FFF2-40B4-BE49-F238E27FC236}">
+                <a16:creationId xmlns:a16="http://schemas.microsoft.com/office/drawing/2014/main" id="{80A1CC7F-FD4A-42FE-B92C-8C903B3E8838}"/>
+              </a:ext>
+            </a:extLst>
+          </p:cNvPr>
+          <p:cNvCxnSpPr/>
+          <p:nvPr/>
+        </p:nvCxnSpPr>
+        <p:spPr>
+          <a:xfrm>
+            <a:off x="5305424" y="4137422"/>
+            <a:ext cx="0" cy="425054"/>
+          </a:xfrm>
+          <a:prstGeom prst="line">
+            <a:avLst/>
+          </a:prstGeom>
+          <a:ln w="12700">
+            <a:solidFill>
+              <a:srgbClr val="00B050"/>
+            </a:solidFill>
+          </a:ln>
+        </p:spPr>
+        <p:style>
+          <a:lnRef idx="1">
+            <a:schemeClr val="accent1"/>
+          </a:lnRef>
+          <a:fillRef idx="0">
+            <a:schemeClr val="accent1"/>
+          </a:fillRef>
+          <a:effectRef idx="0">
+            <a:schemeClr val="accent1"/>
+          </a:effectRef>
+          <a:fontRef idx="minor">
+            <a:schemeClr val="tx1"/>
+          </a:fontRef>
+        </p:style>
+      </p:cxnSp>
+      <p:sp>
+        <p:nvSpPr>
+          <p:cNvPr id="40" name="ZoneTexte 39">
+            <a:extLst>
+              <a:ext uri="{FF2B5EF4-FFF2-40B4-BE49-F238E27FC236}">
+                <a16:creationId xmlns:a16="http://schemas.microsoft.com/office/drawing/2014/main" id="{E6DD5C83-F68B-4DBB-8FE5-9511E11F0FB9}"/>
+              </a:ext>
+            </a:extLst>
+          </p:cNvPr>
+          <p:cNvSpPr txBox="1"/>
+          <p:nvPr/>
+        </p:nvSpPr>
+        <p:spPr>
+          <a:xfrm>
+            <a:off x="2714186" y="3245297"/>
+            <a:ext cx="298479" cy="584775"/>
+          </a:xfrm>
+          <a:prstGeom prst="rect">
+            <a:avLst/>
+          </a:prstGeom>
+          <a:noFill/>
+        </p:spPr>
+        <p:txBody>
+          <a:bodyPr wrap="none" rtlCol="0">
+            <a:spAutoFit/>
+          </a:bodyPr>
+          <a:lstStyle/>
+          <a:p>
+            <a:pPr algn="ctr"/>
+            <a:r>
+              <a:rPr lang="fr-FR" sz="800" dirty="0"/>
+              <a:t>D2</a:t>
+            </a:r>
+          </a:p>
+          <a:p>
+            <a:pPr algn="ctr"/>
+            <a:r>
+              <a:rPr lang="fr-FR" sz="800" dirty="0"/>
+              <a:t>D3</a:t>
+            </a:r>
+          </a:p>
+          <a:p>
+            <a:pPr algn="ctr"/>
+            <a:r>
+              <a:rPr lang="fr-FR" sz="800" dirty="0"/>
+              <a:t>V</a:t>
+            </a:r>
+          </a:p>
+          <a:p>
+            <a:pPr algn="ctr"/>
+            <a:r>
+              <a:rPr lang="fr-FR" sz="800" dirty="0"/>
+              <a:t>G</a:t>
+            </a:r>
+          </a:p>
+        </p:txBody>
+      </p:sp>
+      <p:sp>
+        <p:nvSpPr>
+          <p:cNvPr id="43" name="Ellipse 42">
+            <a:extLst>
+              <a:ext uri="{FF2B5EF4-FFF2-40B4-BE49-F238E27FC236}">
+                <a16:creationId xmlns:a16="http://schemas.microsoft.com/office/drawing/2014/main" id="{E241C3E0-D8DF-4DC0-9C52-1C64D34E7D87}"/>
+              </a:ext>
+            </a:extLst>
+          </p:cNvPr>
+          <p:cNvSpPr/>
+          <p:nvPr/>
+        </p:nvSpPr>
+        <p:spPr>
+          <a:xfrm>
+            <a:off x="3087117" y="3462101"/>
+            <a:ext cx="45719" cy="45719"/>
+          </a:xfrm>
+          <a:prstGeom prst="ellipse">
+            <a:avLst/>
+          </a:prstGeom>
+          <a:solidFill>
+            <a:schemeClr val="tx1"/>
+          </a:solidFill>
+          <a:ln>
+            <a:solidFill>
+              <a:schemeClr val="tx1"/>
+            </a:solidFill>
+          </a:ln>
+        </p:spPr>
+        <p:style>
+          <a:lnRef idx="2">
+            <a:schemeClr val="accent1">
+              <a:shade val="50000"/>
+            </a:schemeClr>
+          </a:lnRef>
+          <a:fillRef idx="1">
+            <a:schemeClr val="accent1"/>
+          </a:fillRef>
+          <a:effectRef idx="0">
+            <a:schemeClr val="accent1"/>
+          </a:effectRef>
+          <a:fontRef idx="minor">
+            <a:schemeClr val="lt1"/>
+          </a:fontRef>
+        </p:style>
+        <p:txBody>
+          <a:bodyPr rtlCol="0" anchor="ctr"/>
+          <a:lstStyle/>
+          <a:p>
+            <a:pPr algn="ctr"/>
+            <a:endParaRPr lang="fr-FR"/>
+          </a:p>
+        </p:txBody>
+      </p:sp>
+      <p:sp>
+        <p:nvSpPr>
+          <p:cNvPr id="66" name="Ellipse 65">
+            <a:extLst>
+              <a:ext uri="{FF2B5EF4-FFF2-40B4-BE49-F238E27FC236}">
+                <a16:creationId xmlns:a16="http://schemas.microsoft.com/office/drawing/2014/main" id="{EA46CE69-F415-4D2B-9BDC-1AD59E86F895}"/>
+              </a:ext>
+            </a:extLst>
+          </p:cNvPr>
+          <p:cNvSpPr/>
+          <p:nvPr/>
+        </p:nvSpPr>
+        <p:spPr>
+          <a:xfrm>
+            <a:off x="3087118" y="3348243"/>
+            <a:ext cx="45719" cy="45719"/>
+          </a:xfrm>
+          <a:prstGeom prst="ellipse">
+            <a:avLst/>
+          </a:prstGeom>
+          <a:solidFill>
+            <a:schemeClr val="tx1"/>
+          </a:solidFill>
+          <a:ln>
+            <a:solidFill>
+              <a:schemeClr val="tx1"/>
+            </a:solidFill>
+          </a:ln>
+        </p:spPr>
+        <p:style>
+          <a:lnRef idx="2">
+            <a:schemeClr val="accent1">
+              <a:shade val="50000"/>
+            </a:schemeClr>
+          </a:lnRef>
+          <a:fillRef idx="1">
+            <a:schemeClr val="accent1"/>
+          </a:fillRef>
+          <a:effectRef idx="0">
+            <a:schemeClr val="accent1"/>
+          </a:effectRef>
+          <a:fontRef idx="minor">
+            <a:schemeClr val="lt1"/>
+          </a:fontRef>
+        </p:style>
+        <p:txBody>
+          <a:bodyPr rtlCol="0" anchor="ctr"/>
+          <a:lstStyle/>
+          <a:p>
+            <a:pPr algn="ctr"/>
+            <a:endParaRPr lang="fr-FR"/>
+          </a:p>
+        </p:txBody>
+      </p:sp>
+      <p:sp>
+        <p:nvSpPr>
+          <p:cNvPr id="67" name="Ellipse 66">
+            <a:extLst>
+              <a:ext uri="{FF2B5EF4-FFF2-40B4-BE49-F238E27FC236}">
+                <a16:creationId xmlns:a16="http://schemas.microsoft.com/office/drawing/2014/main" id="{5A5B6CEC-6E5C-4F89-81EE-4DD1FA59E200}"/>
+              </a:ext>
+            </a:extLst>
+          </p:cNvPr>
+          <p:cNvSpPr/>
+          <p:nvPr/>
+        </p:nvSpPr>
+        <p:spPr>
+          <a:xfrm>
+            <a:off x="3083346" y="3566880"/>
+            <a:ext cx="45719" cy="45719"/>
+          </a:xfrm>
+          <a:prstGeom prst="ellipse">
+            <a:avLst/>
+          </a:prstGeom>
+          <a:solidFill>
+            <a:schemeClr val="tx1"/>
+          </a:solidFill>
+          <a:ln>
+            <a:solidFill>
+              <a:schemeClr val="tx1"/>
+            </a:solidFill>
+          </a:ln>
+        </p:spPr>
+        <p:style>
+          <a:lnRef idx="2">
+            <a:schemeClr val="accent1">
+              <a:shade val="50000"/>
+            </a:schemeClr>
+          </a:lnRef>
+          <a:fillRef idx="1">
+            <a:schemeClr val="accent1"/>
+          </a:fillRef>
+          <a:effectRef idx="0">
+            <a:schemeClr val="accent1"/>
+          </a:effectRef>
+          <a:fontRef idx="minor">
+            <a:schemeClr val="lt1"/>
+          </a:fontRef>
+        </p:style>
+        <p:txBody>
+          <a:bodyPr rtlCol="0" anchor="ctr"/>
+          <a:lstStyle/>
+          <a:p>
+            <a:pPr algn="ctr"/>
+            <a:endParaRPr lang="fr-FR"/>
+          </a:p>
+        </p:txBody>
+      </p:sp>
+      <p:sp>
+        <p:nvSpPr>
+          <p:cNvPr id="68" name="Ellipse 67">
+            <a:extLst>
+              <a:ext uri="{FF2B5EF4-FFF2-40B4-BE49-F238E27FC236}">
+                <a16:creationId xmlns:a16="http://schemas.microsoft.com/office/drawing/2014/main" id="{EC2BB65E-E2B2-421A-9DD2-633FA4E8B488}"/>
+              </a:ext>
+            </a:extLst>
+          </p:cNvPr>
+          <p:cNvSpPr/>
+          <p:nvPr/>
+        </p:nvSpPr>
+        <p:spPr>
+          <a:xfrm>
+            <a:off x="3083346" y="3687875"/>
+            <a:ext cx="45719" cy="45719"/>
+          </a:xfrm>
+          <a:prstGeom prst="ellipse">
+            <a:avLst/>
+          </a:prstGeom>
+          <a:solidFill>
+            <a:schemeClr val="tx1"/>
+          </a:solidFill>
+          <a:ln>
+            <a:solidFill>
+              <a:schemeClr val="tx1"/>
+            </a:solidFill>
+          </a:ln>
+        </p:spPr>
+        <p:style>
+          <a:lnRef idx="2">
+            <a:schemeClr val="accent1">
+              <a:shade val="50000"/>
+            </a:schemeClr>
+          </a:lnRef>
+          <a:fillRef idx="1">
+            <a:schemeClr val="accent1"/>
+          </a:fillRef>
+          <a:effectRef idx="0">
+            <a:schemeClr val="accent1"/>
+          </a:effectRef>
+          <a:fontRef idx="minor">
+            <a:schemeClr val="lt1"/>
+          </a:fontRef>
+        </p:style>
+        <p:txBody>
+          <a:bodyPr rtlCol="0" anchor="ctr"/>
+          <a:lstStyle/>
+          <a:p>
+            <a:pPr algn="ctr"/>
+            <a:endParaRPr lang="fr-FR"/>
+          </a:p>
+        </p:txBody>
+      </p:sp>
+      <p:sp>
+        <p:nvSpPr>
+          <p:cNvPr id="69" name="Ellipse 68">
+            <a:extLst>
+              <a:ext uri="{FF2B5EF4-FFF2-40B4-BE49-F238E27FC236}">
+                <a16:creationId xmlns:a16="http://schemas.microsoft.com/office/drawing/2014/main" id="{A363D631-F2FA-4697-B919-72F0337D116A}"/>
+              </a:ext>
+            </a:extLst>
+          </p:cNvPr>
+          <p:cNvSpPr/>
+          <p:nvPr/>
+        </p:nvSpPr>
+        <p:spPr>
+          <a:xfrm>
+            <a:off x="5801678" y="3142057"/>
+            <a:ext cx="45719" cy="45719"/>
+          </a:xfrm>
+          <a:prstGeom prst="ellipse">
+            <a:avLst/>
+          </a:prstGeom>
+          <a:solidFill>
+            <a:schemeClr val="tx1"/>
+          </a:solidFill>
+          <a:ln>
+            <a:solidFill>
+              <a:schemeClr val="tx1"/>
+            </a:solidFill>
+          </a:ln>
+        </p:spPr>
+        <p:style>
+          <a:lnRef idx="2">
+            <a:schemeClr val="accent1">
+              <a:shade val="50000"/>
+            </a:schemeClr>
+          </a:lnRef>
+          <a:fillRef idx="1">
+            <a:schemeClr val="accent1"/>
+          </a:fillRef>
+          <a:effectRef idx="0">
+            <a:schemeClr val="accent1"/>
+          </a:effectRef>
+          <a:fontRef idx="minor">
+            <a:schemeClr val="lt1"/>
+          </a:fontRef>
+        </p:style>
+        <p:txBody>
+          <a:bodyPr rtlCol="0" anchor="ctr"/>
+          <a:lstStyle/>
+          <a:p>
+            <a:pPr algn="ctr"/>
+            <a:endParaRPr lang="fr-FR"/>
+          </a:p>
+        </p:txBody>
+      </p:sp>
+      <p:sp>
+        <p:nvSpPr>
+          <p:cNvPr id="70" name="Ellipse 69">
+            <a:extLst>
+              <a:ext uri="{FF2B5EF4-FFF2-40B4-BE49-F238E27FC236}">
+                <a16:creationId xmlns:a16="http://schemas.microsoft.com/office/drawing/2014/main" id="{E960BF6C-662D-49E8-A052-C48C5E22BDD6}"/>
+              </a:ext>
+            </a:extLst>
+          </p:cNvPr>
+          <p:cNvSpPr/>
+          <p:nvPr/>
+        </p:nvSpPr>
+        <p:spPr>
+          <a:xfrm>
+            <a:off x="5580157" y="3140213"/>
+            <a:ext cx="45719" cy="45719"/>
+          </a:xfrm>
+          <a:prstGeom prst="ellipse">
+            <a:avLst/>
+          </a:prstGeom>
+          <a:solidFill>
+            <a:schemeClr val="tx1"/>
+          </a:solidFill>
+          <a:ln>
+            <a:solidFill>
+              <a:schemeClr val="tx1"/>
+            </a:solidFill>
+          </a:ln>
+        </p:spPr>
+        <p:style>
+          <a:lnRef idx="2">
+            <a:schemeClr val="accent1">
+              <a:shade val="50000"/>
+            </a:schemeClr>
+          </a:lnRef>
+          <a:fillRef idx="1">
+            <a:schemeClr val="accent1"/>
+          </a:fillRef>
+          <a:effectRef idx="0">
+            <a:schemeClr val="accent1"/>
+          </a:effectRef>
+          <a:fontRef idx="minor">
+            <a:schemeClr val="lt1"/>
+          </a:fontRef>
+        </p:style>
+        <p:txBody>
+          <a:bodyPr rtlCol="0" anchor="ctr"/>
+          <a:lstStyle/>
+          <a:p>
+            <a:pPr algn="ctr"/>
+            <a:endParaRPr lang="fr-FR"/>
+          </a:p>
+        </p:txBody>
+      </p:sp>
+      <p:sp>
+        <p:nvSpPr>
+          <p:cNvPr id="71" name="Ellipse 70">
+            <a:extLst>
+              <a:ext uri="{FF2B5EF4-FFF2-40B4-BE49-F238E27FC236}">
+                <a16:creationId xmlns:a16="http://schemas.microsoft.com/office/drawing/2014/main" id="{189CE01C-2E2E-4B58-9042-D386661D49EA}"/>
+              </a:ext>
+            </a:extLst>
+          </p:cNvPr>
+          <p:cNvSpPr/>
+          <p:nvPr/>
+        </p:nvSpPr>
+        <p:spPr>
+          <a:xfrm>
+            <a:off x="5284746" y="4109799"/>
+            <a:ext cx="45719" cy="45719"/>
+          </a:xfrm>
+          <a:prstGeom prst="ellipse">
+            <a:avLst/>
+          </a:prstGeom>
+          <a:solidFill>
+            <a:schemeClr val="tx1"/>
+          </a:solidFill>
+          <a:ln>
+            <a:solidFill>
+              <a:schemeClr val="tx1"/>
+            </a:solidFill>
+          </a:ln>
+        </p:spPr>
+        <p:style>
+          <a:lnRef idx="2">
+            <a:schemeClr val="accent1">
+              <a:shade val="50000"/>
+            </a:schemeClr>
+          </a:lnRef>
+          <a:fillRef idx="1">
+            <a:schemeClr val="accent1"/>
+          </a:fillRef>
+          <a:effectRef idx="0">
+            <a:schemeClr val="accent1"/>
+          </a:effectRef>
+          <a:fontRef idx="minor">
+            <a:schemeClr val="lt1"/>
+          </a:fontRef>
+        </p:style>
+        <p:txBody>
+          <a:bodyPr rtlCol="0" anchor="ctr"/>
+          <a:lstStyle/>
+          <a:p>
+            <a:pPr algn="ctr"/>
+            <a:endParaRPr lang="fr-FR"/>
+          </a:p>
+        </p:txBody>
+      </p:sp>
+      <p:sp>
+        <p:nvSpPr>
+          <p:cNvPr id="72" name="Ellipse 71">
+            <a:extLst>
+              <a:ext uri="{FF2B5EF4-FFF2-40B4-BE49-F238E27FC236}">
+                <a16:creationId xmlns:a16="http://schemas.microsoft.com/office/drawing/2014/main" id="{B09780F3-929E-43E0-AF9B-1C89B6349600}"/>
+              </a:ext>
+            </a:extLst>
+          </p:cNvPr>
+          <p:cNvSpPr/>
+          <p:nvPr/>
+        </p:nvSpPr>
+        <p:spPr>
+          <a:xfrm>
+            <a:off x="5497732" y="4109798"/>
+            <a:ext cx="45719" cy="45719"/>
+          </a:xfrm>
+          <a:prstGeom prst="ellipse">
+            <a:avLst/>
+          </a:prstGeom>
+          <a:solidFill>
+            <a:schemeClr val="tx1"/>
+          </a:solidFill>
+          <a:ln>
+            <a:solidFill>
+              <a:schemeClr val="tx1"/>
+            </a:solidFill>
+          </a:ln>
+        </p:spPr>
+        <p:style>
+          <a:lnRef idx="2">
+            <a:schemeClr val="accent1">
+              <a:shade val="50000"/>
+            </a:schemeClr>
+          </a:lnRef>
+          <a:fillRef idx="1">
+            <a:schemeClr val="accent1"/>
+          </a:fillRef>
+          <a:effectRef idx="0">
+            <a:schemeClr val="accent1"/>
+          </a:effectRef>
+          <a:fontRef idx="minor">
+            <a:schemeClr val="lt1"/>
+          </a:fontRef>
+        </p:style>
+        <p:txBody>
+          <a:bodyPr rtlCol="0" anchor="ctr"/>
+          <a:lstStyle/>
+          <a:p>
+            <a:pPr algn="ctr"/>
+            <a:endParaRPr lang="fr-FR"/>
+          </a:p>
+        </p:txBody>
+      </p:sp>
+      <p:sp>
+        <p:nvSpPr>
+          <p:cNvPr id="73" name="ZoneTexte 72">
+            <a:extLst>
+              <a:ext uri="{FF2B5EF4-FFF2-40B4-BE49-F238E27FC236}">
+                <a16:creationId xmlns:a16="http://schemas.microsoft.com/office/drawing/2014/main" id="{48CC1D2D-594B-498F-B199-0BC65F31C40F}"/>
+              </a:ext>
+            </a:extLst>
+          </p:cNvPr>
+          <p:cNvSpPr txBox="1"/>
+          <p:nvPr/>
+        </p:nvSpPr>
+        <p:spPr>
+          <a:xfrm>
+            <a:off x="5968681" y="2678703"/>
+            <a:ext cx="1011239" cy="307777"/>
+          </a:xfrm>
+          <a:prstGeom prst="rect">
+            <a:avLst/>
+          </a:prstGeom>
+          <a:noFill/>
+        </p:spPr>
+        <p:txBody>
+          <a:bodyPr wrap="none" rtlCol="0">
+            <a:spAutoFit/>
+          </a:bodyPr>
+          <a:lstStyle/>
+          <a:p>
+            <a:r>
+              <a:rPr lang="fr-FR" sz="1400" i="1" dirty="0"/>
+              <a:t>Protoboard</a:t>
+            </a:r>
+          </a:p>
+        </p:txBody>
+      </p:sp>
+      <p:sp>
+        <p:nvSpPr>
+          <p:cNvPr id="74" name="Rectangle 73">
+            <a:extLst>
+              <a:ext uri="{FF2B5EF4-FFF2-40B4-BE49-F238E27FC236}">
+                <a16:creationId xmlns:a16="http://schemas.microsoft.com/office/drawing/2014/main" id="{B86BF41A-3851-48F4-A786-833B83CEC6CD}"/>
+              </a:ext>
+            </a:extLst>
+          </p:cNvPr>
+          <p:cNvSpPr/>
+          <p:nvPr/>
+        </p:nvSpPr>
+        <p:spPr>
+          <a:xfrm>
+            <a:off x="8383158" y="2986480"/>
+            <a:ext cx="2273416" cy="2298584"/>
+          </a:xfrm>
+          <a:prstGeom prst="rect">
+            <a:avLst/>
+          </a:prstGeom>
+          <a:noFill/>
+          <a:ln>
+            <a:solidFill>
+              <a:schemeClr val="tx1"/>
+            </a:solidFill>
+            <a:prstDash val="dash"/>
+          </a:ln>
+        </p:spPr>
+        <p:style>
+          <a:lnRef idx="2">
+            <a:schemeClr val="accent1">
+              <a:shade val="50000"/>
+            </a:schemeClr>
+          </a:lnRef>
+          <a:fillRef idx="1">
+            <a:schemeClr val="accent1"/>
+          </a:fillRef>
+          <a:effectRef idx="0">
+            <a:schemeClr val="accent1"/>
+          </a:effectRef>
+          <a:fontRef idx="minor">
+            <a:schemeClr val="lt1"/>
+          </a:fontRef>
+        </p:style>
+        <p:txBody>
+          <a:bodyPr rtlCol="0" anchor="ctr"/>
+          <a:lstStyle/>
+          <a:p>
+            <a:pPr algn="ctr"/>
+            <a:endParaRPr lang="fr-FR"/>
+          </a:p>
+        </p:txBody>
+      </p:sp>
+      <p:sp>
+        <p:nvSpPr>
+          <p:cNvPr id="75" name="ZoneTexte 74">
+            <a:extLst>
+              <a:ext uri="{FF2B5EF4-FFF2-40B4-BE49-F238E27FC236}">
+                <a16:creationId xmlns:a16="http://schemas.microsoft.com/office/drawing/2014/main" id="{DA5FF1CA-222B-40D1-A039-AFC07CA78422}"/>
+              </a:ext>
+            </a:extLst>
+          </p:cNvPr>
+          <p:cNvSpPr txBox="1"/>
+          <p:nvPr/>
+        </p:nvSpPr>
+        <p:spPr>
+          <a:xfrm>
+            <a:off x="8382299" y="2678703"/>
+            <a:ext cx="1494961" cy="307777"/>
+          </a:xfrm>
+          <a:prstGeom prst="rect">
+            <a:avLst/>
+          </a:prstGeom>
+          <a:noFill/>
+        </p:spPr>
+        <p:txBody>
+          <a:bodyPr wrap="none" rtlCol="0">
+            <a:spAutoFit/>
+          </a:bodyPr>
+          <a:lstStyle/>
+          <a:p>
+            <a:r>
+              <a:rPr lang="fr-FR" sz="1400" i="1" dirty="0"/>
+              <a:t>Pluviomètre Davis</a:t>
+            </a:r>
+          </a:p>
+        </p:txBody>
+      </p:sp>
+      <p:cxnSp>
+        <p:nvCxnSpPr>
+          <p:cNvPr id="46" name="Connecteur droit 45">
+            <a:extLst>
+              <a:ext uri="{FF2B5EF4-FFF2-40B4-BE49-F238E27FC236}">
+                <a16:creationId xmlns:a16="http://schemas.microsoft.com/office/drawing/2014/main" id="{9951A7C7-120B-4791-B61F-25DD41F76482}"/>
+              </a:ext>
+            </a:extLst>
+          </p:cNvPr>
+          <p:cNvCxnSpPr/>
+          <p:nvPr/>
+        </p:nvCxnSpPr>
+        <p:spPr>
+          <a:xfrm>
+            <a:off x="9997638" y="3460082"/>
+            <a:ext cx="0" cy="418423"/>
+          </a:xfrm>
+          <a:prstGeom prst="line">
+            <a:avLst/>
+          </a:prstGeom>
+          <a:ln w="12700">
+            <a:solidFill>
+              <a:schemeClr val="tx1"/>
+            </a:solidFill>
+          </a:ln>
+        </p:spPr>
+        <p:style>
+          <a:lnRef idx="1">
+            <a:schemeClr val="accent1"/>
+          </a:lnRef>
+          <a:fillRef idx="0">
+            <a:schemeClr val="accent1"/>
+          </a:fillRef>
+          <a:effectRef idx="0">
+            <a:schemeClr val="accent1"/>
+          </a:effectRef>
+          <a:fontRef idx="minor">
+            <a:schemeClr val="tx1"/>
+          </a:fontRef>
+        </p:style>
+      </p:cxnSp>
+      <p:sp>
+        <p:nvSpPr>
+          <p:cNvPr id="76" name="Ellipse 75">
+            <a:extLst>
+              <a:ext uri="{FF2B5EF4-FFF2-40B4-BE49-F238E27FC236}">
+                <a16:creationId xmlns:a16="http://schemas.microsoft.com/office/drawing/2014/main" id="{608670CA-90C1-4555-9741-8D7F619CA117}"/>
+              </a:ext>
+            </a:extLst>
+          </p:cNvPr>
+          <p:cNvSpPr/>
+          <p:nvPr/>
+        </p:nvSpPr>
+        <p:spPr>
+          <a:xfrm>
+            <a:off x="9974778" y="3855645"/>
+            <a:ext cx="45719" cy="45719"/>
+          </a:xfrm>
+          <a:prstGeom prst="ellipse">
+            <a:avLst/>
+          </a:prstGeom>
+          <a:solidFill>
+            <a:schemeClr val="tx1"/>
+          </a:solidFill>
+          <a:ln>
+            <a:solidFill>
+              <a:schemeClr val="tx1"/>
+            </a:solidFill>
+          </a:ln>
+        </p:spPr>
+        <p:style>
+          <a:lnRef idx="2">
+            <a:schemeClr val="accent1">
+              <a:shade val="50000"/>
+            </a:schemeClr>
+          </a:lnRef>
+          <a:fillRef idx="1">
+            <a:schemeClr val="accent1"/>
+          </a:fillRef>
+          <a:effectRef idx="0">
+            <a:schemeClr val="accent1"/>
+          </a:effectRef>
+          <a:fontRef idx="minor">
+            <a:schemeClr val="lt1"/>
+          </a:fontRef>
+        </p:style>
+        <p:txBody>
+          <a:bodyPr rtlCol="0" anchor="ctr"/>
+          <a:lstStyle/>
+          <a:p>
+            <a:pPr algn="ctr"/>
+            <a:endParaRPr lang="fr-FR"/>
+          </a:p>
+        </p:txBody>
+      </p:sp>
+      <p:sp>
+        <p:nvSpPr>
+          <p:cNvPr id="77" name="Ellipse 76">
+            <a:extLst>
+              <a:ext uri="{FF2B5EF4-FFF2-40B4-BE49-F238E27FC236}">
+                <a16:creationId xmlns:a16="http://schemas.microsoft.com/office/drawing/2014/main" id="{AE656000-88C7-4598-9542-FAF1D7CDBE0E}"/>
+              </a:ext>
+            </a:extLst>
+          </p:cNvPr>
+          <p:cNvSpPr/>
+          <p:nvPr/>
+        </p:nvSpPr>
+        <p:spPr>
+          <a:xfrm>
+            <a:off x="9974777" y="4186281"/>
+            <a:ext cx="45719" cy="45719"/>
+          </a:xfrm>
+          <a:prstGeom prst="ellipse">
+            <a:avLst/>
+          </a:prstGeom>
+          <a:solidFill>
+            <a:schemeClr val="tx1"/>
+          </a:solidFill>
+          <a:ln>
+            <a:solidFill>
+              <a:schemeClr val="tx1"/>
+            </a:solidFill>
+          </a:ln>
+        </p:spPr>
+        <p:style>
+          <a:lnRef idx="2">
+            <a:schemeClr val="accent1">
+              <a:shade val="50000"/>
+            </a:schemeClr>
+          </a:lnRef>
+          <a:fillRef idx="1">
+            <a:schemeClr val="accent1"/>
+          </a:fillRef>
+          <a:effectRef idx="0">
+            <a:schemeClr val="accent1"/>
+          </a:effectRef>
+          <a:fontRef idx="minor">
+            <a:schemeClr val="lt1"/>
+          </a:fontRef>
+        </p:style>
+        <p:txBody>
+          <a:bodyPr rtlCol="0" anchor="ctr"/>
+          <a:lstStyle/>
+          <a:p>
+            <a:pPr algn="ctr"/>
+            <a:endParaRPr lang="fr-FR"/>
+          </a:p>
+        </p:txBody>
+      </p:sp>
+      <p:cxnSp>
+        <p:nvCxnSpPr>
+          <p:cNvPr id="78" name="Connecteur droit 77">
+            <a:extLst>
+              <a:ext uri="{FF2B5EF4-FFF2-40B4-BE49-F238E27FC236}">
+                <a16:creationId xmlns:a16="http://schemas.microsoft.com/office/drawing/2014/main" id="{92ECFF18-1C70-4DC7-9FC2-5E8B4D74A926}"/>
+              </a:ext>
+            </a:extLst>
+          </p:cNvPr>
+          <p:cNvCxnSpPr/>
+          <p:nvPr/>
+        </p:nvCxnSpPr>
+        <p:spPr>
+          <a:xfrm>
+            <a:off x="9997636" y="4209140"/>
+            <a:ext cx="0" cy="418423"/>
+          </a:xfrm>
+          <a:prstGeom prst="line">
+            <a:avLst/>
+          </a:prstGeom>
+          <a:ln w="12700">
+            <a:solidFill>
+              <a:schemeClr val="tx1"/>
+            </a:solidFill>
+          </a:ln>
+        </p:spPr>
+        <p:style>
+          <a:lnRef idx="1">
+            <a:schemeClr val="accent1"/>
+          </a:lnRef>
+          <a:fillRef idx="0">
+            <a:schemeClr val="accent1"/>
+          </a:fillRef>
+          <a:effectRef idx="0">
+            <a:schemeClr val="accent1"/>
+          </a:effectRef>
+          <a:fontRef idx="minor">
+            <a:schemeClr val="tx1"/>
+          </a:fontRef>
+        </p:style>
+      </p:cxnSp>
+      <p:cxnSp>
+        <p:nvCxnSpPr>
+          <p:cNvPr id="79" name="Connecteur droit 78">
+            <a:extLst>
+              <a:ext uri="{FF2B5EF4-FFF2-40B4-BE49-F238E27FC236}">
+                <a16:creationId xmlns:a16="http://schemas.microsoft.com/office/drawing/2014/main" id="{4248DEDE-9BD3-4C25-8E94-36EDD7AE8345}"/>
+              </a:ext>
+            </a:extLst>
+          </p:cNvPr>
+          <p:cNvCxnSpPr>
+            <a:cxnSpLocks/>
+          </p:cNvCxnSpPr>
+          <p:nvPr/>
+        </p:nvCxnSpPr>
+        <p:spPr>
+          <a:xfrm flipH="1">
+            <a:off x="9997636" y="3910535"/>
+            <a:ext cx="95687" cy="303247"/>
+          </a:xfrm>
+          <a:prstGeom prst="line">
+            <a:avLst/>
+          </a:prstGeom>
+          <a:ln w="12700">
+            <a:solidFill>
+              <a:schemeClr val="tx1"/>
+            </a:solidFill>
+          </a:ln>
+        </p:spPr>
+        <p:style>
+          <a:lnRef idx="1">
+            <a:schemeClr val="accent1"/>
+          </a:lnRef>
+          <a:fillRef idx="0">
+            <a:schemeClr val="accent1"/>
+          </a:fillRef>
+          <a:effectRef idx="0">
+            <a:schemeClr val="accent1"/>
+          </a:effectRef>
+          <a:fontRef idx="minor">
+            <a:schemeClr val="tx1"/>
+          </a:fontRef>
+        </p:style>
+      </p:cxnSp>
+      <p:cxnSp>
+        <p:nvCxnSpPr>
+          <p:cNvPr id="80" name="Connecteur droit 79">
+            <a:extLst>
+              <a:ext uri="{FF2B5EF4-FFF2-40B4-BE49-F238E27FC236}">
+                <a16:creationId xmlns:a16="http://schemas.microsoft.com/office/drawing/2014/main" id="{88B97F0E-8E10-44C0-B485-7DC530B3D8DF}"/>
+              </a:ext>
+            </a:extLst>
+          </p:cNvPr>
+          <p:cNvCxnSpPr>
+            <a:cxnSpLocks/>
+          </p:cNvCxnSpPr>
+          <p:nvPr/>
+        </p:nvCxnSpPr>
+        <p:spPr>
+          <a:xfrm>
+            <a:off x="9086850" y="3460082"/>
+            <a:ext cx="910786" cy="0"/>
+          </a:xfrm>
+          <a:prstGeom prst="line">
+            <a:avLst/>
+          </a:prstGeom>
+          <a:ln w="12700">
+            <a:solidFill>
+              <a:schemeClr val="tx1"/>
+            </a:solidFill>
+          </a:ln>
+        </p:spPr>
+        <p:style>
+          <a:lnRef idx="1">
+            <a:schemeClr val="accent1"/>
+          </a:lnRef>
+          <a:fillRef idx="0">
+            <a:schemeClr val="accent1"/>
+          </a:fillRef>
+          <a:effectRef idx="0">
+            <a:schemeClr val="accent1"/>
+          </a:effectRef>
+          <a:fontRef idx="minor">
+            <a:schemeClr val="tx1"/>
+          </a:fontRef>
+        </p:style>
+      </p:cxnSp>
+      <p:cxnSp>
+        <p:nvCxnSpPr>
+          <p:cNvPr id="81" name="Connecteur droit 80">
+            <a:extLst>
+              <a:ext uri="{FF2B5EF4-FFF2-40B4-BE49-F238E27FC236}">
+                <a16:creationId xmlns:a16="http://schemas.microsoft.com/office/drawing/2014/main" id="{E64A5C43-4F5C-480B-BE7B-AE3E8D53F0BE}"/>
+              </a:ext>
+            </a:extLst>
+          </p:cNvPr>
+          <p:cNvCxnSpPr>
+            <a:cxnSpLocks/>
+          </p:cNvCxnSpPr>
+          <p:nvPr/>
+        </p:nvCxnSpPr>
+        <p:spPr>
+          <a:xfrm>
+            <a:off x="9086850" y="4627563"/>
+            <a:ext cx="910786" cy="0"/>
+          </a:xfrm>
+          <a:prstGeom prst="line">
+            <a:avLst/>
+          </a:prstGeom>
+          <a:ln w="12700">
+            <a:solidFill>
+              <a:schemeClr val="tx1"/>
+            </a:solidFill>
+          </a:ln>
+        </p:spPr>
+        <p:style>
+          <a:lnRef idx="1">
+            <a:schemeClr val="accent1"/>
+          </a:lnRef>
+          <a:fillRef idx="0">
+            <a:schemeClr val="accent1"/>
+          </a:fillRef>
+          <a:effectRef idx="0">
+            <a:schemeClr val="accent1"/>
+          </a:effectRef>
+          <a:fontRef idx="minor">
+            <a:schemeClr val="tx1"/>
+          </a:fontRef>
+        </p:style>
+      </p:cxnSp>
+      <p:cxnSp>
+        <p:nvCxnSpPr>
+          <p:cNvPr id="82" name="Connecteur droit 81">
+            <a:extLst>
+              <a:ext uri="{FF2B5EF4-FFF2-40B4-BE49-F238E27FC236}">
+                <a16:creationId xmlns:a16="http://schemas.microsoft.com/office/drawing/2014/main" id="{7FB8756E-2047-42E5-8A6A-1765A27CB60D}"/>
+              </a:ext>
+            </a:extLst>
+          </p:cNvPr>
+          <p:cNvCxnSpPr>
+            <a:cxnSpLocks/>
+          </p:cNvCxnSpPr>
+          <p:nvPr/>
+        </p:nvCxnSpPr>
+        <p:spPr>
+          <a:xfrm flipH="1">
+            <a:off x="9086851" y="3449371"/>
+            <a:ext cx="1" cy="546354"/>
+          </a:xfrm>
+          <a:prstGeom prst="line">
+            <a:avLst/>
+          </a:prstGeom>
+          <a:ln w="12700">
+            <a:solidFill>
+              <a:schemeClr val="tx1"/>
+            </a:solidFill>
+          </a:ln>
+        </p:spPr>
+        <p:style>
+          <a:lnRef idx="1">
+            <a:schemeClr val="accent1"/>
+          </a:lnRef>
+          <a:fillRef idx="0">
+            <a:schemeClr val="accent1"/>
+          </a:fillRef>
+          <a:effectRef idx="0">
+            <a:schemeClr val="accent1"/>
+          </a:effectRef>
+          <a:fontRef idx="minor">
+            <a:schemeClr val="tx1"/>
+          </a:fontRef>
+        </p:style>
+      </p:cxnSp>
+      <p:cxnSp>
+        <p:nvCxnSpPr>
+          <p:cNvPr id="83" name="Connecteur droit 82">
+            <a:extLst>
+              <a:ext uri="{FF2B5EF4-FFF2-40B4-BE49-F238E27FC236}">
+                <a16:creationId xmlns:a16="http://schemas.microsoft.com/office/drawing/2014/main" id="{8ADDB239-C89D-4BA0-9BA5-49509AAE5D47}"/>
+              </a:ext>
+            </a:extLst>
+          </p:cNvPr>
+          <p:cNvCxnSpPr>
+            <a:cxnSpLocks/>
+          </p:cNvCxnSpPr>
+          <p:nvPr/>
+        </p:nvCxnSpPr>
+        <p:spPr>
+          <a:xfrm>
+            <a:off x="9086850" y="4109798"/>
+            <a:ext cx="0" cy="517765"/>
+          </a:xfrm>
+          <a:prstGeom prst="line">
+            <a:avLst/>
+          </a:prstGeom>
+          <a:ln w="12700">
+            <a:solidFill>
+              <a:schemeClr val="tx1"/>
+            </a:solidFill>
+          </a:ln>
+        </p:spPr>
+        <p:style>
+          <a:lnRef idx="1">
+            <a:schemeClr val="accent1"/>
+          </a:lnRef>
+          <a:fillRef idx="0">
+            <a:schemeClr val="accent1"/>
+          </a:fillRef>
+          <a:effectRef idx="0">
+            <a:schemeClr val="accent1"/>
+          </a:effectRef>
+          <a:fontRef idx="minor">
+            <a:schemeClr val="tx1"/>
+          </a:fontRef>
+        </p:style>
+      </p:cxnSp>
+      <p:cxnSp>
+        <p:nvCxnSpPr>
+          <p:cNvPr id="84" name="Connecteur droit 83">
+            <a:extLst>
+              <a:ext uri="{FF2B5EF4-FFF2-40B4-BE49-F238E27FC236}">
+                <a16:creationId xmlns:a16="http://schemas.microsoft.com/office/drawing/2014/main" id="{847C071F-D520-48B1-8607-91F4D7AA7582}"/>
+              </a:ext>
+            </a:extLst>
+          </p:cNvPr>
+          <p:cNvCxnSpPr>
+            <a:cxnSpLocks/>
+          </p:cNvCxnSpPr>
+          <p:nvPr/>
+        </p:nvCxnSpPr>
+        <p:spPr>
+          <a:xfrm>
+            <a:off x="8334373" y="3989376"/>
+            <a:ext cx="752475" cy="0"/>
+          </a:xfrm>
+          <a:prstGeom prst="line">
+            <a:avLst/>
+          </a:prstGeom>
+          <a:ln w="12700">
+            <a:solidFill>
+              <a:schemeClr val="tx1"/>
+            </a:solidFill>
+          </a:ln>
+        </p:spPr>
+        <p:style>
+          <a:lnRef idx="1">
+            <a:schemeClr val="accent1"/>
+          </a:lnRef>
+          <a:fillRef idx="0">
+            <a:schemeClr val="accent1"/>
+          </a:fillRef>
+          <a:effectRef idx="0">
+            <a:schemeClr val="accent1"/>
+          </a:effectRef>
+          <a:fontRef idx="minor">
+            <a:schemeClr val="tx1"/>
+          </a:fontRef>
+        </p:style>
+      </p:cxnSp>
+      <p:cxnSp>
+        <p:nvCxnSpPr>
+          <p:cNvPr id="85" name="Connecteur droit 84">
+            <a:extLst>
+              <a:ext uri="{FF2B5EF4-FFF2-40B4-BE49-F238E27FC236}">
+                <a16:creationId xmlns:a16="http://schemas.microsoft.com/office/drawing/2014/main" id="{E32038D1-7D41-47B8-818B-523FC695BD30}"/>
+              </a:ext>
+            </a:extLst>
+          </p:cNvPr>
+          <p:cNvCxnSpPr>
+            <a:cxnSpLocks/>
+          </p:cNvCxnSpPr>
+          <p:nvPr/>
+        </p:nvCxnSpPr>
+        <p:spPr>
+          <a:xfrm>
+            <a:off x="8334374" y="4109798"/>
+            <a:ext cx="752475" cy="0"/>
+          </a:xfrm>
+          <a:prstGeom prst="line">
+            <a:avLst/>
+          </a:prstGeom>
+          <a:ln w="12700">
+            <a:solidFill>
+              <a:schemeClr val="tx1"/>
+            </a:solidFill>
+          </a:ln>
+        </p:spPr>
+        <p:style>
+          <a:lnRef idx="1">
+            <a:schemeClr val="accent1"/>
+          </a:lnRef>
+          <a:fillRef idx="0">
+            <a:schemeClr val="accent1"/>
+          </a:fillRef>
+          <a:effectRef idx="0">
+            <a:schemeClr val="accent1"/>
+          </a:effectRef>
+          <a:fontRef idx="minor">
+            <a:schemeClr val="tx1"/>
+          </a:fontRef>
+        </p:style>
+      </p:cxnSp>
+      <p:cxnSp>
+        <p:nvCxnSpPr>
+          <p:cNvPr id="95" name="Connecteur : en angle 94">
+            <a:extLst>
+              <a:ext uri="{FF2B5EF4-FFF2-40B4-BE49-F238E27FC236}">
+                <a16:creationId xmlns:a16="http://schemas.microsoft.com/office/drawing/2014/main" id="{29461CE8-9E5F-4F8D-950C-30877A5EECA4}"/>
+              </a:ext>
+            </a:extLst>
+          </p:cNvPr>
+          <p:cNvCxnSpPr>
+            <a:cxnSpLocks/>
+          </p:cNvCxnSpPr>
+          <p:nvPr/>
+        </p:nvCxnSpPr>
+        <p:spPr>
+          <a:xfrm flipV="1">
+            <a:off x="6378575" y="4109800"/>
+            <a:ext cx="1955798" cy="649609"/>
+          </a:xfrm>
+          <a:prstGeom prst="bentConnector3">
+            <a:avLst/>
+          </a:prstGeom>
+          <a:ln w="12700">
+            <a:solidFill>
+              <a:srgbClr val="00B050"/>
+            </a:solidFill>
+          </a:ln>
+        </p:spPr>
+        <p:style>
+          <a:lnRef idx="1">
+            <a:schemeClr val="accent1"/>
+          </a:lnRef>
+          <a:fillRef idx="0">
+            <a:schemeClr val="accent1"/>
+          </a:fillRef>
+          <a:effectRef idx="0">
+            <a:schemeClr val="accent1"/>
+          </a:effectRef>
+          <a:fontRef idx="minor">
+            <a:schemeClr val="tx1"/>
+          </a:fontRef>
+        </p:style>
+      </p:cxnSp>
+      <p:cxnSp>
+        <p:nvCxnSpPr>
+          <p:cNvPr id="98" name="Connecteur : en angle 97">
+            <a:extLst>
+              <a:ext uri="{FF2B5EF4-FFF2-40B4-BE49-F238E27FC236}">
+                <a16:creationId xmlns:a16="http://schemas.microsoft.com/office/drawing/2014/main" id="{77740A99-B923-4577-9065-D4F8D4E8F719}"/>
+              </a:ext>
+            </a:extLst>
+          </p:cNvPr>
+          <p:cNvCxnSpPr>
+            <a:cxnSpLocks/>
+          </p:cNvCxnSpPr>
+          <p:nvPr/>
+        </p:nvCxnSpPr>
+        <p:spPr>
+          <a:xfrm flipV="1">
+            <a:off x="6121037" y="3989377"/>
+            <a:ext cx="2212907" cy="638186"/>
+          </a:xfrm>
+          <a:prstGeom prst="bentConnector3">
+            <a:avLst/>
+          </a:prstGeom>
+          <a:ln w="12700">
+            <a:solidFill>
+              <a:srgbClr val="FF0000"/>
+            </a:solidFill>
+          </a:ln>
+        </p:spPr>
+        <p:style>
+          <a:lnRef idx="1">
+            <a:schemeClr val="accent1"/>
+          </a:lnRef>
+          <a:fillRef idx="0">
+            <a:schemeClr val="accent1"/>
+          </a:fillRef>
+          <a:effectRef idx="0">
+            <a:schemeClr val="accent1"/>
+          </a:effectRef>
+          <a:fontRef idx="minor">
+            <a:schemeClr val="tx1"/>
+          </a:fontRef>
+        </p:style>
+      </p:cxnSp>
+      <p:cxnSp>
+        <p:nvCxnSpPr>
+          <p:cNvPr id="101" name="Connecteur droit 100">
+            <a:extLst>
+              <a:ext uri="{FF2B5EF4-FFF2-40B4-BE49-F238E27FC236}">
+                <a16:creationId xmlns:a16="http://schemas.microsoft.com/office/drawing/2014/main" id="{54ABCA77-F93B-47C9-9E62-DEFF728EB8FF}"/>
+              </a:ext>
+            </a:extLst>
+          </p:cNvPr>
+          <p:cNvCxnSpPr>
+            <a:cxnSpLocks/>
+          </p:cNvCxnSpPr>
+          <p:nvPr/>
+        </p:nvCxnSpPr>
+        <p:spPr>
+          <a:xfrm flipH="1">
+            <a:off x="6064671" y="4624388"/>
+            <a:ext cx="56367" cy="0"/>
+          </a:xfrm>
+          <a:prstGeom prst="line">
+            <a:avLst/>
+          </a:prstGeom>
+          <a:ln w="12700">
+            <a:solidFill>
+              <a:srgbClr val="FF0000"/>
+            </a:solidFill>
+          </a:ln>
+        </p:spPr>
+        <p:style>
+          <a:lnRef idx="1">
+            <a:schemeClr val="accent1"/>
+          </a:lnRef>
+          <a:fillRef idx="0">
+            <a:schemeClr val="accent1"/>
+          </a:fillRef>
+          <a:effectRef idx="0">
+            <a:schemeClr val="accent1"/>
+          </a:effectRef>
+          <a:fontRef idx="minor">
+            <a:schemeClr val="tx1"/>
+          </a:fontRef>
+        </p:style>
+      </p:cxnSp>
+      <p:cxnSp>
+        <p:nvCxnSpPr>
+          <p:cNvPr id="102" name="Connecteur droit 101">
+            <a:extLst>
+              <a:ext uri="{FF2B5EF4-FFF2-40B4-BE49-F238E27FC236}">
+                <a16:creationId xmlns:a16="http://schemas.microsoft.com/office/drawing/2014/main" id="{DE65E803-7385-4BFB-B528-41A6E2257F97}"/>
+              </a:ext>
+            </a:extLst>
+          </p:cNvPr>
+          <p:cNvCxnSpPr>
+            <a:cxnSpLocks/>
+          </p:cNvCxnSpPr>
+          <p:nvPr/>
+        </p:nvCxnSpPr>
+        <p:spPr>
+          <a:xfrm flipH="1">
+            <a:off x="6020764" y="4757738"/>
+            <a:ext cx="366974" cy="1671"/>
+          </a:xfrm>
+          <a:prstGeom prst="line">
+            <a:avLst/>
+          </a:prstGeom>
+          <a:ln w="12700">
+            <a:solidFill>
+              <a:srgbClr val="00B050"/>
+            </a:solidFill>
+          </a:ln>
+        </p:spPr>
+        <p:style>
+          <a:lnRef idx="1">
+            <a:schemeClr val="accent1"/>
+          </a:lnRef>
+          <a:fillRef idx="0">
+            <a:schemeClr val="accent1"/>
+          </a:fillRef>
+          <a:effectRef idx="0">
+            <a:schemeClr val="accent1"/>
+          </a:effectRef>
+          <a:fontRef idx="minor">
+            <a:schemeClr val="tx1"/>
+          </a:fontRef>
+        </p:style>
+      </p:cxnSp>
+      <p:cxnSp>
+        <p:nvCxnSpPr>
+          <p:cNvPr id="106" name="Connecteur droit 105">
+            <a:extLst>
+              <a:ext uri="{FF2B5EF4-FFF2-40B4-BE49-F238E27FC236}">
+                <a16:creationId xmlns:a16="http://schemas.microsoft.com/office/drawing/2014/main" id="{AF851876-73A7-4D0D-996A-14188869C718}"/>
+              </a:ext>
+            </a:extLst>
+          </p:cNvPr>
+          <p:cNvCxnSpPr>
+            <a:cxnSpLocks/>
+          </p:cNvCxnSpPr>
+          <p:nvPr/>
+        </p:nvCxnSpPr>
+        <p:spPr>
+          <a:xfrm flipH="1" flipV="1">
+            <a:off x="6070782" y="3878504"/>
+            <a:ext cx="1" cy="745884"/>
+          </a:xfrm>
+          <a:prstGeom prst="line">
+            <a:avLst/>
+          </a:prstGeom>
+          <a:ln w="12700">
+            <a:solidFill>
+              <a:srgbClr val="FF0000"/>
+            </a:solidFill>
+          </a:ln>
+        </p:spPr>
+        <p:style>
+          <a:lnRef idx="1">
+            <a:schemeClr val="accent1"/>
+          </a:lnRef>
+          <a:fillRef idx="0">
+            <a:schemeClr val="accent1"/>
+          </a:fillRef>
+          <a:effectRef idx="0">
+            <a:schemeClr val="accent1"/>
+          </a:effectRef>
+          <a:fontRef idx="minor">
+            <a:schemeClr val="tx1"/>
+          </a:fontRef>
+        </p:style>
+      </p:cxnSp>
+      <p:cxnSp>
+        <p:nvCxnSpPr>
+          <p:cNvPr id="108" name="Connecteur droit 107">
+            <a:extLst>
+              <a:ext uri="{FF2B5EF4-FFF2-40B4-BE49-F238E27FC236}">
+                <a16:creationId xmlns:a16="http://schemas.microsoft.com/office/drawing/2014/main" id="{5676055E-DEE5-4979-ADBE-9C658648100C}"/>
+              </a:ext>
+            </a:extLst>
+          </p:cNvPr>
+          <p:cNvCxnSpPr>
+            <a:cxnSpLocks/>
+          </p:cNvCxnSpPr>
+          <p:nvPr/>
+        </p:nvCxnSpPr>
+        <p:spPr>
+          <a:xfrm flipH="1" flipV="1">
+            <a:off x="6015886" y="3878504"/>
+            <a:ext cx="7251" cy="890546"/>
+          </a:xfrm>
+          <a:prstGeom prst="line">
+            <a:avLst/>
+          </a:prstGeom>
+          <a:ln w="12700">
+            <a:solidFill>
+              <a:srgbClr val="00B050"/>
+            </a:solidFill>
+          </a:ln>
+        </p:spPr>
+        <p:style>
+          <a:lnRef idx="1">
+            <a:schemeClr val="accent1"/>
+          </a:lnRef>
+          <a:fillRef idx="0">
+            <a:schemeClr val="accent1"/>
+          </a:fillRef>
+          <a:effectRef idx="0">
+            <a:schemeClr val="accent1"/>
+          </a:effectRef>
+          <a:fontRef idx="minor">
+            <a:schemeClr val="tx1"/>
+          </a:fontRef>
+        </p:style>
+      </p:cxnSp>
+      <p:cxnSp>
+        <p:nvCxnSpPr>
+          <p:cNvPr id="112" name="Connecteur : en angle 111">
+            <a:extLst>
+              <a:ext uri="{FF2B5EF4-FFF2-40B4-BE49-F238E27FC236}">
+                <a16:creationId xmlns:a16="http://schemas.microsoft.com/office/drawing/2014/main" id="{BB5798EC-0A79-45FD-80A1-786BCDB03DAE}"/>
+              </a:ext>
+            </a:extLst>
+          </p:cNvPr>
+          <p:cNvCxnSpPr>
+            <a:cxnSpLocks/>
+          </p:cNvCxnSpPr>
+          <p:nvPr/>
+        </p:nvCxnSpPr>
+        <p:spPr>
+          <a:xfrm flipV="1">
+            <a:off x="6191743" y="3933825"/>
+            <a:ext cx="1977744" cy="634641"/>
+          </a:xfrm>
+          <a:prstGeom prst="bentConnector3">
+            <a:avLst/>
+          </a:prstGeom>
+          <a:ln w="12700">
+            <a:solidFill>
+              <a:schemeClr val="tx1"/>
+            </a:solidFill>
+            <a:prstDash val="sysDot"/>
+          </a:ln>
+        </p:spPr>
+        <p:style>
+          <a:lnRef idx="1">
+            <a:schemeClr val="accent1"/>
+          </a:lnRef>
+          <a:fillRef idx="0">
+            <a:schemeClr val="accent1"/>
+          </a:fillRef>
+          <a:effectRef idx="0">
+            <a:schemeClr val="accent1"/>
+          </a:effectRef>
+          <a:fontRef idx="minor">
+            <a:schemeClr val="tx1"/>
+          </a:fontRef>
+        </p:style>
+      </p:cxnSp>
+      <p:cxnSp>
+        <p:nvCxnSpPr>
+          <p:cNvPr id="114" name="Connecteur : en angle 113">
+            <a:extLst>
+              <a:ext uri="{FF2B5EF4-FFF2-40B4-BE49-F238E27FC236}">
+                <a16:creationId xmlns:a16="http://schemas.microsoft.com/office/drawing/2014/main" id="{68062DC9-6697-4CA0-95B7-440242A27C93}"/>
+              </a:ext>
+            </a:extLst>
+          </p:cNvPr>
+          <p:cNvCxnSpPr>
+            <a:cxnSpLocks/>
+          </p:cNvCxnSpPr>
+          <p:nvPr/>
+        </p:nvCxnSpPr>
+        <p:spPr>
+          <a:xfrm flipV="1">
+            <a:off x="6627470" y="4155517"/>
+            <a:ext cx="1555116" cy="653729"/>
+          </a:xfrm>
+          <a:prstGeom prst="bentConnector3">
+            <a:avLst/>
+          </a:prstGeom>
+          <a:ln w="12700">
+            <a:solidFill>
+              <a:schemeClr val="tx1"/>
+            </a:solidFill>
+            <a:prstDash val="sysDot"/>
+          </a:ln>
+        </p:spPr>
+        <p:style>
+          <a:lnRef idx="1">
+            <a:schemeClr val="accent1"/>
+          </a:lnRef>
+          <a:fillRef idx="0">
+            <a:schemeClr val="accent1"/>
+          </a:fillRef>
+          <a:effectRef idx="0">
+            <a:schemeClr val="accent1"/>
+          </a:effectRef>
+          <a:fontRef idx="minor">
+            <a:schemeClr val="tx1"/>
+          </a:fontRef>
+        </p:style>
+      </p:cxnSp>
+      <p:cxnSp>
+        <p:nvCxnSpPr>
+          <p:cNvPr id="117" name="Connecteur droit 116">
+            <a:extLst>
+              <a:ext uri="{FF2B5EF4-FFF2-40B4-BE49-F238E27FC236}">
+                <a16:creationId xmlns:a16="http://schemas.microsoft.com/office/drawing/2014/main" id="{478FFDAF-FB1E-44B4-8867-6250C883245A}"/>
+              </a:ext>
+            </a:extLst>
+          </p:cNvPr>
+          <p:cNvCxnSpPr/>
+          <p:nvPr/>
+        </p:nvCxnSpPr>
+        <p:spPr>
+          <a:xfrm>
+            <a:off x="8340937" y="3933825"/>
+            <a:ext cx="0" cy="221692"/>
+          </a:xfrm>
+          <a:prstGeom prst="line">
+            <a:avLst/>
+          </a:prstGeom>
+          <a:ln w="12700">
+            <a:solidFill>
+              <a:schemeClr val="tx1"/>
+            </a:solidFill>
+            <a:prstDash val="sysDot"/>
+          </a:ln>
+        </p:spPr>
+        <p:style>
+          <a:lnRef idx="1">
+            <a:schemeClr val="accent1"/>
+          </a:lnRef>
+          <a:fillRef idx="0">
+            <a:schemeClr val="accent1"/>
+          </a:fillRef>
+          <a:effectRef idx="0">
+            <a:schemeClr val="accent1"/>
+          </a:effectRef>
+          <a:fontRef idx="minor">
+            <a:schemeClr val="tx1"/>
+          </a:fontRef>
+        </p:style>
+      </p:cxnSp>
+      <p:cxnSp>
+        <p:nvCxnSpPr>
+          <p:cNvPr id="118" name="Connecteur droit 117">
+            <a:extLst>
+              <a:ext uri="{FF2B5EF4-FFF2-40B4-BE49-F238E27FC236}">
+                <a16:creationId xmlns:a16="http://schemas.microsoft.com/office/drawing/2014/main" id="{49469F71-B026-46B6-9904-C061AAC364CA}"/>
+              </a:ext>
+            </a:extLst>
+          </p:cNvPr>
+          <p:cNvCxnSpPr>
+            <a:cxnSpLocks/>
+          </p:cNvCxnSpPr>
+          <p:nvPr/>
+        </p:nvCxnSpPr>
+        <p:spPr>
+          <a:xfrm>
+            <a:off x="8169487" y="3933825"/>
+            <a:ext cx="171450" cy="0"/>
+          </a:xfrm>
+          <a:prstGeom prst="line">
+            <a:avLst/>
+          </a:prstGeom>
+          <a:ln w="12700">
+            <a:solidFill>
+              <a:schemeClr val="tx1"/>
+            </a:solidFill>
+            <a:prstDash val="sysDot"/>
+          </a:ln>
+        </p:spPr>
+        <p:style>
+          <a:lnRef idx="1">
+            <a:schemeClr val="accent1"/>
+          </a:lnRef>
+          <a:fillRef idx="0">
+            <a:schemeClr val="accent1"/>
+          </a:fillRef>
+          <a:effectRef idx="0">
+            <a:schemeClr val="accent1"/>
+          </a:effectRef>
+          <a:fontRef idx="minor">
+            <a:schemeClr val="tx1"/>
+          </a:fontRef>
+        </p:style>
+      </p:cxnSp>
+      <p:cxnSp>
+        <p:nvCxnSpPr>
+          <p:cNvPr id="120" name="Connecteur droit 119">
+            <a:extLst>
+              <a:ext uri="{FF2B5EF4-FFF2-40B4-BE49-F238E27FC236}">
+                <a16:creationId xmlns:a16="http://schemas.microsoft.com/office/drawing/2014/main" id="{DD6A2319-4D11-42CF-956A-65C6FDC48192}"/>
+              </a:ext>
+            </a:extLst>
+          </p:cNvPr>
+          <p:cNvCxnSpPr>
+            <a:cxnSpLocks/>
+          </p:cNvCxnSpPr>
+          <p:nvPr/>
+        </p:nvCxnSpPr>
+        <p:spPr>
+          <a:xfrm>
+            <a:off x="8182586" y="4155517"/>
+            <a:ext cx="171450" cy="0"/>
+          </a:xfrm>
+          <a:prstGeom prst="line">
+            <a:avLst/>
+          </a:prstGeom>
+          <a:ln w="12700">
+            <a:solidFill>
+              <a:schemeClr val="tx1"/>
+            </a:solidFill>
+            <a:prstDash val="sysDot"/>
+          </a:ln>
+        </p:spPr>
+        <p:style>
+          <a:lnRef idx="1">
+            <a:schemeClr val="accent1"/>
+          </a:lnRef>
+          <a:fillRef idx="0">
+            <a:schemeClr val="accent1"/>
+          </a:fillRef>
+          <a:effectRef idx="0">
+            <a:schemeClr val="accent1"/>
+          </a:effectRef>
+          <a:fontRef idx="minor">
+            <a:schemeClr val="tx1"/>
+          </a:fontRef>
+        </p:style>
+      </p:cxnSp>
+      <p:cxnSp>
+        <p:nvCxnSpPr>
+          <p:cNvPr id="121" name="Connecteur droit 120">
+            <a:extLst>
+              <a:ext uri="{FF2B5EF4-FFF2-40B4-BE49-F238E27FC236}">
+                <a16:creationId xmlns:a16="http://schemas.microsoft.com/office/drawing/2014/main" id="{9CDEC423-56E6-4ECC-8151-CDDE6285A4DC}"/>
+              </a:ext>
+            </a:extLst>
+          </p:cNvPr>
+          <p:cNvCxnSpPr>
+            <a:cxnSpLocks/>
+          </p:cNvCxnSpPr>
+          <p:nvPr/>
+        </p:nvCxnSpPr>
+        <p:spPr>
+          <a:xfrm>
+            <a:off x="5968681" y="4805513"/>
+            <a:ext cx="650107" cy="0"/>
+          </a:xfrm>
+          <a:prstGeom prst="line">
+            <a:avLst/>
+          </a:prstGeom>
+          <a:ln w="12700">
+            <a:solidFill>
+              <a:schemeClr val="tx1"/>
+            </a:solidFill>
+            <a:prstDash val="sysDot"/>
+          </a:ln>
+        </p:spPr>
+        <p:style>
+          <a:lnRef idx="1">
+            <a:schemeClr val="accent1"/>
+          </a:lnRef>
+          <a:fillRef idx="0">
+            <a:schemeClr val="accent1"/>
+          </a:fillRef>
+          <a:effectRef idx="0">
+            <a:schemeClr val="accent1"/>
+          </a:effectRef>
+          <a:fontRef idx="minor">
+            <a:schemeClr val="tx1"/>
+          </a:fontRef>
+        </p:style>
+      </p:cxnSp>
+      <p:cxnSp>
+        <p:nvCxnSpPr>
+          <p:cNvPr id="123" name="Connecteur droit 122">
+            <a:extLst>
+              <a:ext uri="{FF2B5EF4-FFF2-40B4-BE49-F238E27FC236}">
+                <a16:creationId xmlns:a16="http://schemas.microsoft.com/office/drawing/2014/main" id="{249279A5-E8D6-41CD-946F-3A48151A0BA0}"/>
+              </a:ext>
+            </a:extLst>
+          </p:cNvPr>
+          <p:cNvCxnSpPr>
+            <a:cxnSpLocks/>
+          </p:cNvCxnSpPr>
+          <p:nvPr/>
+        </p:nvCxnSpPr>
+        <p:spPr>
+          <a:xfrm>
+            <a:off x="5968681" y="3878504"/>
+            <a:ext cx="0" cy="939710"/>
+          </a:xfrm>
+          <a:prstGeom prst="line">
+            <a:avLst/>
+          </a:prstGeom>
+          <a:ln w="12700">
+            <a:solidFill>
+              <a:schemeClr val="tx1"/>
+            </a:solidFill>
+            <a:prstDash val="sysDot"/>
+          </a:ln>
+        </p:spPr>
+        <p:style>
+          <a:lnRef idx="1">
+            <a:schemeClr val="accent1"/>
+          </a:lnRef>
+          <a:fillRef idx="0">
+            <a:schemeClr val="accent1"/>
+          </a:fillRef>
+          <a:effectRef idx="0">
+            <a:schemeClr val="accent1"/>
+          </a:effectRef>
+          <a:fontRef idx="minor">
+            <a:schemeClr val="tx1"/>
+          </a:fontRef>
+        </p:style>
+      </p:cxnSp>
+      <p:cxnSp>
+        <p:nvCxnSpPr>
+          <p:cNvPr id="126" name="Connecteur droit 125">
+            <a:extLst>
+              <a:ext uri="{FF2B5EF4-FFF2-40B4-BE49-F238E27FC236}">
+                <a16:creationId xmlns:a16="http://schemas.microsoft.com/office/drawing/2014/main" id="{B52D2711-CAFD-48BE-A1E6-4ADCF38EFFFD}"/>
+              </a:ext>
+            </a:extLst>
+          </p:cNvPr>
+          <p:cNvCxnSpPr>
+            <a:cxnSpLocks/>
+          </p:cNvCxnSpPr>
+          <p:nvPr/>
+        </p:nvCxnSpPr>
+        <p:spPr>
+          <a:xfrm>
+            <a:off x="6121037" y="3878504"/>
+            <a:ext cx="0" cy="701149"/>
+          </a:xfrm>
+          <a:prstGeom prst="line">
+            <a:avLst/>
+          </a:prstGeom>
+          <a:ln w="12700">
+            <a:solidFill>
+              <a:schemeClr val="tx1"/>
+            </a:solidFill>
+            <a:prstDash val="sysDot"/>
+          </a:ln>
+        </p:spPr>
+        <p:style>
+          <a:lnRef idx="1">
+            <a:schemeClr val="accent1"/>
+          </a:lnRef>
+          <a:fillRef idx="0">
+            <a:schemeClr val="accent1"/>
+          </a:fillRef>
+          <a:effectRef idx="0">
+            <a:schemeClr val="accent1"/>
+          </a:effectRef>
+          <a:fontRef idx="minor">
+            <a:schemeClr val="tx1"/>
+          </a:fontRef>
+        </p:style>
+      </p:cxnSp>
+      <p:cxnSp>
+        <p:nvCxnSpPr>
+          <p:cNvPr id="128" name="Connecteur droit 127">
+            <a:extLst>
+              <a:ext uri="{FF2B5EF4-FFF2-40B4-BE49-F238E27FC236}">
+                <a16:creationId xmlns:a16="http://schemas.microsoft.com/office/drawing/2014/main" id="{76747103-081C-4584-9926-8156D22CB5E7}"/>
+              </a:ext>
+            </a:extLst>
+          </p:cNvPr>
+          <p:cNvCxnSpPr>
+            <a:cxnSpLocks/>
+          </p:cNvCxnSpPr>
+          <p:nvPr/>
+        </p:nvCxnSpPr>
+        <p:spPr>
+          <a:xfrm>
+            <a:off x="6115351" y="4570128"/>
+            <a:ext cx="110824" cy="0"/>
+          </a:xfrm>
+          <a:prstGeom prst="line">
+            <a:avLst/>
+          </a:prstGeom>
+          <a:ln w="12700">
+            <a:solidFill>
+              <a:schemeClr val="tx1"/>
+            </a:solidFill>
+            <a:prstDash val="sysDot"/>
+          </a:ln>
+        </p:spPr>
+        <p:style>
+          <a:lnRef idx="1">
+            <a:schemeClr val="accent1"/>
+          </a:lnRef>
+          <a:fillRef idx="0">
+            <a:schemeClr val="accent1"/>
+          </a:fillRef>
+          <a:effectRef idx="0">
+            <a:schemeClr val="accent1"/>
+          </a:effectRef>
+          <a:fontRef idx="minor">
+            <a:schemeClr val="tx1"/>
+          </a:fontRef>
+        </p:style>
+      </p:cxnSp>
+      <p:cxnSp>
+        <p:nvCxnSpPr>
+          <p:cNvPr id="130" name="Connecteur droit 129">
+            <a:extLst>
+              <a:ext uri="{FF2B5EF4-FFF2-40B4-BE49-F238E27FC236}">
+                <a16:creationId xmlns:a16="http://schemas.microsoft.com/office/drawing/2014/main" id="{0E4A3C39-8523-4A46-87BD-F343F2FEC6E3}"/>
+              </a:ext>
+            </a:extLst>
+          </p:cNvPr>
+          <p:cNvCxnSpPr>
+            <a:cxnSpLocks/>
+          </p:cNvCxnSpPr>
+          <p:nvPr/>
+        </p:nvCxnSpPr>
+        <p:spPr>
+          <a:xfrm>
+            <a:off x="5960474" y="3879807"/>
+            <a:ext cx="154877" cy="0"/>
+          </a:xfrm>
+          <a:prstGeom prst="line">
+            <a:avLst/>
+          </a:prstGeom>
+          <a:ln w="12700">
+            <a:solidFill>
+              <a:schemeClr val="tx1"/>
+            </a:solidFill>
+            <a:prstDash val="sysDot"/>
+          </a:ln>
+        </p:spPr>
+        <p:style>
+          <a:lnRef idx="1">
+            <a:schemeClr val="accent1"/>
+          </a:lnRef>
+          <a:fillRef idx="0">
+            <a:schemeClr val="accent1"/>
+          </a:fillRef>
+          <a:effectRef idx="0">
+            <a:schemeClr val="accent1"/>
+          </a:effectRef>
+          <a:fontRef idx="minor">
+            <a:schemeClr val="tx1"/>
+          </a:fontRef>
+        </p:style>
+      </p:cxnSp>
+      <p:sp>
+        <p:nvSpPr>
+          <p:cNvPr id="132" name="ZoneTexte 131">
+            <a:extLst>
+              <a:ext uri="{FF2B5EF4-FFF2-40B4-BE49-F238E27FC236}">
+                <a16:creationId xmlns:a16="http://schemas.microsoft.com/office/drawing/2014/main" id="{327EA83A-0E0A-4853-BB31-11710711F83D}"/>
+              </a:ext>
+            </a:extLst>
+          </p:cNvPr>
+          <p:cNvSpPr txBox="1"/>
+          <p:nvPr/>
+        </p:nvSpPr>
+        <p:spPr>
+          <a:xfrm>
+            <a:off x="7313161" y="3663457"/>
+            <a:ext cx="856325" cy="276999"/>
+          </a:xfrm>
+          <a:prstGeom prst="rect">
+            <a:avLst/>
+          </a:prstGeom>
+          <a:noFill/>
+        </p:spPr>
+        <p:txBody>
+          <a:bodyPr wrap="none" rtlCol="0">
+            <a:spAutoFit/>
+          </a:bodyPr>
+          <a:lstStyle/>
+          <a:p>
+            <a:r>
+              <a:rPr lang="fr-FR" sz="1200" i="1" dirty="0"/>
+              <a:t>Cable RJ11</a:t>
             </a:r>
           </a:p>
         </p:txBody>
@@ -6757,7 +9539,7 @@
     </p:spTree>
     <p:extLst>
       <p:ext uri="{BB962C8B-B14F-4D97-AF65-F5344CB8AC3E}">
-        <p14:creationId xmlns:p14="http://schemas.microsoft.com/office/powerpoint/2010/main" val="2149631933"/>
+        <p14:creationId xmlns:p14="http://schemas.microsoft.com/office/powerpoint/2010/main" val="675812002"/>
       </p:ext>
     </p:extLst>
   </p:cSld>
@@ -7625,7 +10407,7 @@
     </p:spTree>
     <p:extLst>
       <p:ext uri="{BB962C8B-B14F-4D97-AF65-F5344CB8AC3E}">
-        <p14:creationId xmlns:p14="http://schemas.microsoft.com/office/powerpoint/2010/main" val="675812002"/>
+        <p14:creationId xmlns:p14="http://schemas.microsoft.com/office/powerpoint/2010/main" val="2508135460"/>
       </p:ext>
     </p:extLst>
   </p:cSld>
@@ -8516,6 +11298,534 @@
 </file>
 
 <file path=ppt/slides/slide14.xml><?xml version="1.0" encoding="utf-8"?>
+<p:sld xmlns:a="http://schemas.openxmlformats.org/drawingml/2006/main" xmlns:r="http://schemas.openxmlformats.org/officeDocument/2006/relationships" xmlns:p="http://schemas.openxmlformats.org/presentationml/2006/main">
+  <p:cSld>
+    <p:spTree>
+      <p:nvGrpSpPr>
+        <p:cNvPr id="1" name=""/>
+        <p:cNvGrpSpPr/>
+        <p:nvPr/>
+      </p:nvGrpSpPr>
+      <p:grpSpPr>
+        <a:xfrm>
+          <a:off x="0" y="0"/>
+          <a:ext cx="0" cy="0"/>
+          <a:chOff x="0" y="0"/>
+          <a:chExt cx="0" cy="0"/>
+        </a:xfrm>
+      </p:grpSpPr>
+      <p:pic>
+        <p:nvPicPr>
+          <p:cNvPr id="8" name="Image 7">
+            <a:extLst>
+              <a:ext uri="{FF2B5EF4-FFF2-40B4-BE49-F238E27FC236}">
+                <a16:creationId xmlns:a16="http://schemas.microsoft.com/office/drawing/2014/main" id="{2BB825C5-31DA-4A56-85EA-536DBF510A31}"/>
+              </a:ext>
+            </a:extLst>
+          </p:cNvPr>
+          <p:cNvPicPr>
+            <a:picLocks noChangeAspect="1"/>
+          </p:cNvPicPr>
+          <p:nvPr/>
+        </p:nvPicPr>
+        <p:blipFill>
+          <a:blip r:embed="rId2">
+            <a:extLst>
+              <a:ext uri="{28A0092B-C50C-407E-A947-70E740481C1C}">
+                <a14:useLocalDpi xmlns:a14="http://schemas.microsoft.com/office/drawing/2010/main" val="0"/>
+              </a:ext>
+            </a:extLst>
+          </a:blip>
+          <a:stretch>
+            <a:fillRect/>
+          </a:stretch>
+        </p:blipFill>
+        <p:spPr>
+          <a:xfrm>
+            <a:off x="1068751" y="66457"/>
+            <a:ext cx="1259497" cy="776690"/>
+          </a:xfrm>
+          <a:prstGeom prst="rect">
+            <a:avLst/>
+          </a:prstGeom>
+        </p:spPr>
+      </p:pic>
+      <p:pic>
+        <p:nvPicPr>
+          <p:cNvPr id="10" name="Image 9">
+            <a:extLst>
+              <a:ext uri="{FF2B5EF4-FFF2-40B4-BE49-F238E27FC236}">
+                <a16:creationId xmlns:a16="http://schemas.microsoft.com/office/drawing/2014/main" id="{8EE7436F-49F2-41E0-93E4-D247B4705294}"/>
+              </a:ext>
+            </a:extLst>
+          </p:cNvPr>
+          <p:cNvPicPr>
+            <a:picLocks noChangeAspect="1"/>
+          </p:cNvPicPr>
+          <p:nvPr/>
+        </p:nvPicPr>
+        <p:blipFill>
+          <a:blip r:embed="rId3">
+            <a:extLst>
+              <a:ext uri="{28A0092B-C50C-407E-A947-70E740481C1C}">
+                <a14:useLocalDpi xmlns:a14="http://schemas.microsoft.com/office/drawing/2010/main" val="0"/>
+              </a:ext>
+            </a:extLst>
+          </a:blip>
+          <a:stretch>
+            <a:fillRect/>
+          </a:stretch>
+        </p:blipFill>
+        <p:spPr>
+          <a:xfrm>
+            <a:off x="9681085" y="238153"/>
+            <a:ext cx="1802101" cy="569807"/>
+          </a:xfrm>
+          <a:prstGeom prst="rect">
+            <a:avLst/>
+          </a:prstGeom>
+        </p:spPr>
+      </p:pic>
+      <p:cxnSp>
+        <p:nvCxnSpPr>
+          <p:cNvPr id="16" name="Connecteur droit 15">
+            <a:extLst>
+              <a:ext uri="{FF2B5EF4-FFF2-40B4-BE49-F238E27FC236}">
+                <a16:creationId xmlns:a16="http://schemas.microsoft.com/office/drawing/2014/main" id="{7319284A-BD6F-4A96-8E2B-E0A4B52E53C6}"/>
+              </a:ext>
+            </a:extLst>
+          </p:cNvPr>
+          <p:cNvCxnSpPr>
+            <a:cxnSpLocks/>
+          </p:cNvCxnSpPr>
+          <p:nvPr/>
+        </p:nvCxnSpPr>
+        <p:spPr>
+          <a:xfrm flipV="1">
+            <a:off x="0" y="454803"/>
+            <a:ext cx="738231" cy="1798"/>
+          </a:xfrm>
+          <a:prstGeom prst="line">
+            <a:avLst/>
+          </a:prstGeom>
+        </p:spPr>
+        <p:style>
+          <a:lnRef idx="3">
+            <a:schemeClr val="dk1"/>
+          </a:lnRef>
+          <a:fillRef idx="0">
+            <a:schemeClr val="dk1"/>
+          </a:fillRef>
+          <a:effectRef idx="2">
+            <a:schemeClr val="dk1"/>
+          </a:effectRef>
+          <a:fontRef idx="minor">
+            <a:schemeClr val="tx1"/>
+          </a:fontRef>
+        </p:style>
+      </p:cxnSp>
+      <p:cxnSp>
+        <p:nvCxnSpPr>
+          <p:cNvPr id="20" name="Connecteur droit 19">
+            <a:extLst>
+              <a:ext uri="{FF2B5EF4-FFF2-40B4-BE49-F238E27FC236}">
+                <a16:creationId xmlns:a16="http://schemas.microsoft.com/office/drawing/2014/main" id="{08874CF7-F149-4C81-B61E-74E18342BA8A}"/>
+              </a:ext>
+            </a:extLst>
+          </p:cNvPr>
+          <p:cNvCxnSpPr>
+            <a:cxnSpLocks/>
+          </p:cNvCxnSpPr>
+          <p:nvPr/>
+        </p:nvCxnSpPr>
+        <p:spPr>
+          <a:xfrm>
+            <a:off x="2573222" y="454803"/>
+            <a:ext cx="6829482" cy="10398"/>
+          </a:xfrm>
+          <a:prstGeom prst="line">
+            <a:avLst/>
+          </a:prstGeom>
+        </p:spPr>
+        <p:style>
+          <a:lnRef idx="3">
+            <a:schemeClr val="dk1"/>
+          </a:lnRef>
+          <a:fillRef idx="0">
+            <a:schemeClr val="dk1"/>
+          </a:fillRef>
+          <a:effectRef idx="2">
+            <a:schemeClr val="dk1"/>
+          </a:effectRef>
+          <a:fontRef idx="minor">
+            <a:schemeClr val="tx1"/>
+          </a:fontRef>
+        </p:style>
+      </p:cxnSp>
+      <p:cxnSp>
+        <p:nvCxnSpPr>
+          <p:cNvPr id="26" name="Connecteur droit 25">
+            <a:extLst>
+              <a:ext uri="{FF2B5EF4-FFF2-40B4-BE49-F238E27FC236}">
+                <a16:creationId xmlns:a16="http://schemas.microsoft.com/office/drawing/2014/main" id="{BB3B35CC-057B-48C1-880F-3306A6559175}"/>
+              </a:ext>
+            </a:extLst>
+          </p:cNvPr>
+          <p:cNvCxnSpPr>
+            <a:cxnSpLocks/>
+          </p:cNvCxnSpPr>
+          <p:nvPr/>
+        </p:nvCxnSpPr>
+        <p:spPr>
+          <a:xfrm>
+            <a:off x="738231" y="454803"/>
+            <a:ext cx="344203" cy="484764"/>
+          </a:xfrm>
+          <a:prstGeom prst="line">
+            <a:avLst/>
+          </a:prstGeom>
+        </p:spPr>
+        <p:style>
+          <a:lnRef idx="3">
+            <a:schemeClr val="dk1"/>
+          </a:lnRef>
+          <a:fillRef idx="0">
+            <a:schemeClr val="dk1"/>
+          </a:fillRef>
+          <a:effectRef idx="2">
+            <a:schemeClr val="dk1"/>
+          </a:effectRef>
+          <a:fontRef idx="minor">
+            <a:schemeClr val="tx1"/>
+          </a:fontRef>
+        </p:style>
+      </p:cxnSp>
+      <p:cxnSp>
+        <p:nvCxnSpPr>
+          <p:cNvPr id="32" name="Connecteur droit 31">
+            <a:extLst>
+              <a:ext uri="{FF2B5EF4-FFF2-40B4-BE49-F238E27FC236}">
+                <a16:creationId xmlns:a16="http://schemas.microsoft.com/office/drawing/2014/main" id="{4AD96496-1EB6-4E48-9BB2-5C255495C686}"/>
+              </a:ext>
+            </a:extLst>
+          </p:cNvPr>
+          <p:cNvCxnSpPr>
+            <a:cxnSpLocks/>
+          </p:cNvCxnSpPr>
+          <p:nvPr/>
+        </p:nvCxnSpPr>
+        <p:spPr>
+          <a:xfrm>
+            <a:off x="1082434" y="938268"/>
+            <a:ext cx="1146585" cy="0"/>
+          </a:xfrm>
+          <a:prstGeom prst="line">
+            <a:avLst/>
+          </a:prstGeom>
+        </p:spPr>
+        <p:style>
+          <a:lnRef idx="3">
+            <a:schemeClr val="dk1"/>
+          </a:lnRef>
+          <a:fillRef idx="0">
+            <a:schemeClr val="dk1"/>
+          </a:fillRef>
+          <a:effectRef idx="2">
+            <a:schemeClr val="dk1"/>
+          </a:effectRef>
+          <a:fontRef idx="minor">
+            <a:schemeClr val="tx1"/>
+          </a:fontRef>
+        </p:style>
+      </p:cxnSp>
+      <p:cxnSp>
+        <p:nvCxnSpPr>
+          <p:cNvPr id="51" name="Connecteur droit 50">
+            <a:extLst>
+              <a:ext uri="{FF2B5EF4-FFF2-40B4-BE49-F238E27FC236}">
+                <a16:creationId xmlns:a16="http://schemas.microsoft.com/office/drawing/2014/main" id="{C035BFA6-ECBF-4775-BA81-19D2CA41AA8D}"/>
+              </a:ext>
+            </a:extLst>
+          </p:cNvPr>
+          <p:cNvCxnSpPr>
+            <a:cxnSpLocks/>
+          </p:cNvCxnSpPr>
+          <p:nvPr/>
+        </p:nvCxnSpPr>
+        <p:spPr>
+          <a:xfrm>
+            <a:off x="9402704" y="465201"/>
+            <a:ext cx="344203" cy="495163"/>
+          </a:xfrm>
+          <a:prstGeom prst="line">
+            <a:avLst/>
+          </a:prstGeom>
+        </p:spPr>
+        <p:style>
+          <a:lnRef idx="3">
+            <a:schemeClr val="dk1"/>
+          </a:lnRef>
+          <a:fillRef idx="0">
+            <a:schemeClr val="dk1"/>
+          </a:fillRef>
+          <a:effectRef idx="2">
+            <a:schemeClr val="dk1"/>
+          </a:effectRef>
+          <a:fontRef idx="minor">
+            <a:schemeClr val="tx1"/>
+          </a:fontRef>
+        </p:style>
+      </p:cxnSp>
+      <p:cxnSp>
+        <p:nvCxnSpPr>
+          <p:cNvPr id="52" name="Connecteur droit 51">
+            <a:extLst>
+              <a:ext uri="{FF2B5EF4-FFF2-40B4-BE49-F238E27FC236}">
+                <a16:creationId xmlns:a16="http://schemas.microsoft.com/office/drawing/2014/main" id="{FA310BC7-694B-4984-99A2-61A1F4F6EBF9}"/>
+              </a:ext>
+            </a:extLst>
+          </p:cNvPr>
+          <p:cNvCxnSpPr>
+            <a:cxnSpLocks/>
+          </p:cNvCxnSpPr>
+          <p:nvPr/>
+        </p:nvCxnSpPr>
+        <p:spPr>
+          <a:xfrm flipH="1">
+            <a:off x="11370469" y="448308"/>
+            <a:ext cx="364332" cy="501657"/>
+          </a:xfrm>
+          <a:prstGeom prst="line">
+            <a:avLst/>
+          </a:prstGeom>
+        </p:spPr>
+        <p:style>
+          <a:lnRef idx="3">
+            <a:schemeClr val="dk1"/>
+          </a:lnRef>
+          <a:fillRef idx="0">
+            <a:schemeClr val="dk1"/>
+          </a:fillRef>
+          <a:effectRef idx="2">
+            <a:schemeClr val="dk1"/>
+          </a:effectRef>
+          <a:fontRef idx="minor">
+            <a:schemeClr val="tx1"/>
+          </a:fontRef>
+        </p:style>
+      </p:cxnSp>
+      <p:cxnSp>
+        <p:nvCxnSpPr>
+          <p:cNvPr id="53" name="Connecteur droit 52">
+            <a:extLst>
+              <a:ext uri="{FF2B5EF4-FFF2-40B4-BE49-F238E27FC236}">
+                <a16:creationId xmlns:a16="http://schemas.microsoft.com/office/drawing/2014/main" id="{BE0649BD-EE59-4DDA-960F-95B2572F9F13}"/>
+              </a:ext>
+            </a:extLst>
+          </p:cNvPr>
+          <p:cNvCxnSpPr>
+            <a:cxnSpLocks/>
+          </p:cNvCxnSpPr>
+          <p:nvPr/>
+        </p:nvCxnSpPr>
+        <p:spPr>
+          <a:xfrm>
+            <a:off x="9743203" y="949965"/>
+            <a:ext cx="1627266" cy="0"/>
+          </a:xfrm>
+          <a:prstGeom prst="line">
+            <a:avLst/>
+          </a:prstGeom>
+        </p:spPr>
+        <p:style>
+          <a:lnRef idx="3">
+            <a:schemeClr val="dk1"/>
+          </a:lnRef>
+          <a:fillRef idx="0">
+            <a:schemeClr val="dk1"/>
+          </a:fillRef>
+          <a:effectRef idx="2">
+            <a:schemeClr val="dk1"/>
+          </a:effectRef>
+          <a:fontRef idx="minor">
+            <a:schemeClr val="tx1"/>
+          </a:fontRef>
+        </p:style>
+      </p:cxnSp>
+      <p:cxnSp>
+        <p:nvCxnSpPr>
+          <p:cNvPr id="55" name="Connecteur droit 54">
+            <a:extLst>
+              <a:ext uri="{FF2B5EF4-FFF2-40B4-BE49-F238E27FC236}">
+                <a16:creationId xmlns:a16="http://schemas.microsoft.com/office/drawing/2014/main" id="{52AA9200-DAFA-4EEF-AC13-4C7CE82A59EC}"/>
+              </a:ext>
+            </a:extLst>
+          </p:cNvPr>
+          <p:cNvCxnSpPr>
+            <a:cxnSpLocks/>
+          </p:cNvCxnSpPr>
+          <p:nvPr/>
+        </p:nvCxnSpPr>
+        <p:spPr>
+          <a:xfrm>
+            <a:off x="11715750" y="454801"/>
+            <a:ext cx="476249" cy="10400"/>
+          </a:xfrm>
+          <a:prstGeom prst="line">
+            <a:avLst/>
+          </a:prstGeom>
+        </p:spPr>
+        <p:style>
+          <a:lnRef idx="3">
+            <a:schemeClr val="dk1"/>
+          </a:lnRef>
+          <a:fillRef idx="0">
+            <a:schemeClr val="dk1"/>
+          </a:fillRef>
+          <a:effectRef idx="2">
+            <a:schemeClr val="dk1"/>
+          </a:effectRef>
+          <a:fontRef idx="minor">
+            <a:schemeClr val="tx1"/>
+          </a:fontRef>
+        </p:style>
+      </p:cxnSp>
+      <p:cxnSp>
+        <p:nvCxnSpPr>
+          <p:cNvPr id="23" name="Connecteur droit 22">
+            <a:extLst>
+              <a:ext uri="{FF2B5EF4-FFF2-40B4-BE49-F238E27FC236}">
+                <a16:creationId xmlns:a16="http://schemas.microsoft.com/office/drawing/2014/main" id="{BCB092C8-0080-4E56-957E-0046D4C83988}"/>
+              </a:ext>
+            </a:extLst>
+          </p:cNvPr>
+          <p:cNvCxnSpPr>
+            <a:cxnSpLocks/>
+          </p:cNvCxnSpPr>
+          <p:nvPr/>
+        </p:nvCxnSpPr>
+        <p:spPr>
+          <a:xfrm flipH="1">
+            <a:off x="2216372" y="446356"/>
+            <a:ext cx="364332" cy="501657"/>
+          </a:xfrm>
+          <a:prstGeom prst="line">
+            <a:avLst/>
+          </a:prstGeom>
+        </p:spPr>
+        <p:style>
+          <a:lnRef idx="3">
+            <a:schemeClr val="dk1"/>
+          </a:lnRef>
+          <a:fillRef idx="0">
+            <a:schemeClr val="dk1"/>
+          </a:fillRef>
+          <a:effectRef idx="2">
+            <a:schemeClr val="dk1"/>
+          </a:effectRef>
+          <a:fontRef idx="minor">
+            <a:schemeClr val="tx1"/>
+          </a:fontRef>
+        </p:style>
+      </p:cxnSp>
+      <p:sp>
+        <p:nvSpPr>
+          <p:cNvPr id="3" name="ZoneTexte 2">
+            <a:extLst>
+              <a:ext uri="{FF2B5EF4-FFF2-40B4-BE49-F238E27FC236}">
+                <a16:creationId xmlns:a16="http://schemas.microsoft.com/office/drawing/2014/main" id="{DCCD1615-1755-47F7-AF0B-75E932931245}"/>
+              </a:ext>
+            </a:extLst>
+          </p:cNvPr>
+          <p:cNvSpPr txBox="1"/>
+          <p:nvPr/>
+        </p:nvSpPr>
+        <p:spPr>
+          <a:xfrm>
+            <a:off x="1156800" y="3143689"/>
+            <a:ext cx="2695434" cy="646331"/>
+          </a:xfrm>
+          <a:prstGeom prst="rect">
+            <a:avLst/>
+          </a:prstGeom>
+          <a:noFill/>
+        </p:spPr>
+        <p:txBody>
+          <a:bodyPr wrap="square" rtlCol="0">
+            <a:spAutoFit/>
+          </a:bodyPr>
+          <a:lstStyle/>
+          <a:p>
+            <a:endParaRPr lang="fr-FR" dirty="0"/>
+          </a:p>
+          <a:p>
+            <a:endParaRPr lang="fr-FR" dirty="0"/>
+          </a:p>
+        </p:txBody>
+      </p:sp>
+      <p:sp>
+        <p:nvSpPr>
+          <p:cNvPr id="9" name="ZoneTexte 8">
+            <a:extLst>
+              <a:ext uri="{FF2B5EF4-FFF2-40B4-BE49-F238E27FC236}">
+                <a16:creationId xmlns:a16="http://schemas.microsoft.com/office/drawing/2014/main" id="{82010251-0AD2-4DAA-8E6B-7CA6A2301A9E}"/>
+              </a:ext>
+            </a:extLst>
+          </p:cNvPr>
+          <p:cNvSpPr txBox="1"/>
+          <p:nvPr/>
+        </p:nvSpPr>
+        <p:spPr>
+          <a:xfrm>
+            <a:off x="3779870" y="479063"/>
+            <a:ext cx="4416185" cy="769441"/>
+          </a:xfrm>
+          <a:prstGeom prst="rect">
+            <a:avLst/>
+          </a:prstGeom>
+          <a:noFill/>
+        </p:spPr>
+        <p:txBody>
+          <a:bodyPr wrap="square" rtlCol="0">
+            <a:spAutoFit/>
+          </a:bodyPr>
+          <a:lstStyle/>
+          <a:p>
+            <a:r>
+              <a:rPr lang="fr-FR" sz="4400" dirty="0">
+                <a:latin typeface="Berlin Sans FB" panose="020E0602020502020306" pitchFamily="34" charset="0"/>
+              </a:rPr>
+              <a:t>Partie Personnelle</a:t>
+            </a:r>
+          </a:p>
+        </p:txBody>
+      </p:sp>
+    </p:spTree>
+    <p:extLst>
+      <p:ext uri="{BB962C8B-B14F-4D97-AF65-F5344CB8AC3E}">
+        <p14:creationId xmlns:p14="http://schemas.microsoft.com/office/powerpoint/2010/main" val="2149631933"/>
+      </p:ext>
+    </p:extLst>
+  </p:cSld>
+  <p:clrMapOvr>
+    <a:masterClrMapping/>
+  </p:clrMapOvr>
+  <mc:AlternateContent xmlns:mc="http://schemas.openxmlformats.org/markup-compatibility/2006" xmlns:p14="http://schemas.microsoft.com/office/powerpoint/2010/main">
+    <mc:Choice Requires="p14">
+      <p:transition spd="slow">
+        <p14:reveal/>
+      </p:transition>
+    </mc:Choice>
+    <mc:Fallback xmlns="">
+      <p:transition spd="slow">
+        <p:fade/>
+      </p:transition>
+    </mc:Fallback>
+  </mc:AlternateContent>
+</p:sld>
+</file>
+
+<file path=ppt/slides/slide15.xml><?xml version="1.0" encoding="utf-8"?>
 <p:sld xmlns:a="http://schemas.openxmlformats.org/drawingml/2006/main" xmlns:r="http://schemas.openxmlformats.org/officeDocument/2006/relationships" xmlns:p="http://schemas.openxmlformats.org/presentationml/2006/main">
   <p:cSld>
     <p:spTree>

</xml_diff>